<commit_message>
cloud bus ppt commit
</commit_message>
<xml_diff>
--- a/신라버스_201895048_201895099.pptx
+++ b/신라버스_201895048_201895099.pptx
@@ -5,26 +5,27 @@
     <p:sldMasterId id="2147483708" r:id="rId1"/>
   </p:sldMasterIdLst>
   <p:notesMasterIdLst>
-    <p:notesMasterId r:id="rId16"/>
+    <p:notesMasterId r:id="rId17"/>
   </p:notesMasterIdLst>
   <p:handoutMasterIdLst>
-    <p:handoutMasterId r:id="rId17"/>
+    <p:handoutMasterId r:id="rId18"/>
   </p:handoutMasterIdLst>
   <p:sldIdLst>
     <p:sldId id="259" r:id="rId2"/>
     <p:sldId id="294" r:id="rId3"/>
     <p:sldId id="279" r:id="rId4"/>
-    <p:sldId id="296" r:id="rId5"/>
-    <p:sldId id="295" r:id="rId6"/>
-    <p:sldId id="297" r:id="rId7"/>
-    <p:sldId id="298" r:id="rId8"/>
-    <p:sldId id="299" r:id="rId9"/>
-    <p:sldId id="300" r:id="rId10"/>
-    <p:sldId id="302" r:id="rId11"/>
-    <p:sldId id="303" r:id="rId12"/>
-    <p:sldId id="304" r:id="rId13"/>
-    <p:sldId id="308" r:id="rId14"/>
-    <p:sldId id="307" r:id="rId15"/>
+    <p:sldId id="309" r:id="rId5"/>
+    <p:sldId id="296" r:id="rId6"/>
+    <p:sldId id="295" r:id="rId7"/>
+    <p:sldId id="297" r:id="rId8"/>
+    <p:sldId id="298" r:id="rId9"/>
+    <p:sldId id="299" r:id="rId10"/>
+    <p:sldId id="300" r:id="rId11"/>
+    <p:sldId id="302" r:id="rId12"/>
+    <p:sldId id="303" r:id="rId13"/>
+    <p:sldId id="304" r:id="rId14"/>
+    <p:sldId id="308" r:id="rId15"/>
+    <p:sldId id="307" r:id="rId16"/>
   </p:sldIdLst>
   <p:sldSz cx="12192000" cy="6858000"/>
   <p:notesSz cx="6858000" cy="9144000"/>
@@ -4008,14 +4009,47 @@
                 <a:latin typeface="HY견고딕" panose="02030600000101010101" pitchFamily="18" charset="-127"/>
                 <a:ea typeface="HY견고딕" panose="02030600000101010101" pitchFamily="18" charset="-127"/>
               </a:rPr>
-              <a:t>Telegram bot</a:t>
+              <a:t>Storage Table</a:t>
+            </a:r>
+          </a:p>
+        </p:txBody>
+      </p:sp>
+      <p:sp>
+        <p:nvSpPr>
+          <p:cNvPr id="7" name="TextBox 6"/>
+          <p:cNvSpPr txBox="1"/>
+          <p:nvPr/>
+        </p:nvSpPr>
+        <p:spPr>
+          <a:xfrm>
+            <a:off x="6177330" y="501970"/>
+            <a:ext cx="3374664" cy="523220"/>
+          </a:xfrm>
+          <a:prstGeom prst="rect">
+            <a:avLst/>
+          </a:prstGeom>
+          <a:noFill/>
+        </p:spPr>
+        <p:txBody>
+          <a:bodyPr wrap="square" rtlCol="0">
+            <a:spAutoFit/>
+          </a:bodyPr>
+          <a:lstStyle/>
+          <a:p>
+            <a:pPr fontAlgn="base"/>
+            <a:r>
+              <a:rPr lang="en-US" altLang="ko-KR" sz="2800" dirty="0">
+                <a:latin typeface="HY견고딕" panose="02030600000101010101" pitchFamily="18" charset="-127"/>
+                <a:ea typeface="HY견고딕" panose="02030600000101010101" pitchFamily="18" charset="-127"/>
+              </a:rPr>
+              <a:t>Azure</a:t>
             </a:r>
           </a:p>
         </p:txBody>
       </p:sp>
       <p:pic>
         <p:nvPicPr>
-          <p:cNvPr id="11266" name="Picture 2" descr="https://cdn.discordapp.com/attachments/424058557609148418/1051534318356410368/image.png"/>
+          <p:cNvPr id="13318" name="Picture 6" descr="https://cdn.discordapp.com/attachments/424058557609148418/1051532839528693861/image.png"/>
           <p:cNvPicPr>
             <a:picLocks noChangeAspect="1" noChangeArrowheads="1"/>
           </p:cNvPicPr>
@@ -4036,8 +4070,8 @@
         </p:blipFill>
         <p:spPr bwMode="auto">
           <a:xfrm>
-            <a:off x="675402" y="1187115"/>
-            <a:ext cx="6200775" cy="4972050"/>
+            <a:off x="1" y="1355635"/>
+            <a:ext cx="6629400" cy="3518113"/>
           </a:xfrm>
           <a:prstGeom prst="rect">
             <a:avLst/>
@@ -4054,136 +4088,49 @@
           </a:extLst>
         </p:spPr>
       </p:pic>
-      <p:sp>
-        <p:nvSpPr>
-          <p:cNvPr id="8" name="TextBox 7"/>
-          <p:cNvSpPr txBox="1"/>
-          <p:nvPr/>
-        </p:nvSpPr>
-        <p:spPr>
-          <a:xfrm>
-            <a:off x="7115175" y="2642088"/>
-            <a:ext cx="4581525" cy="2062103"/>
-          </a:xfrm>
-          <a:prstGeom prst="rect">
-            <a:avLst/>
-          </a:prstGeom>
-          <a:noFill/>
-        </p:spPr>
-        <p:txBody>
-          <a:bodyPr wrap="square" rtlCol="0">
-            <a:spAutoFit/>
-          </a:bodyPr>
-          <a:lstStyle/>
-          <a:p>
-            <a:r>
-              <a:rPr lang="en-US" altLang="ko-KR" sz="3200" dirty="0">
-                <a:latin typeface="HY견고딕" panose="02030600000101010101" pitchFamily="18" charset="-127"/>
-                <a:ea typeface="HY견고딕" panose="02030600000101010101" pitchFamily="18" charset="-127"/>
-              </a:rPr>
-              <a:t>Telegram </a:t>
-            </a:r>
-            <a:r>
-              <a:rPr lang="ko-KR" altLang="en-US" sz="3200" dirty="0" err="1">
-                <a:latin typeface="HY견고딕" panose="02030600000101010101" pitchFamily="18" charset="-127"/>
-                <a:ea typeface="HY견고딕" panose="02030600000101010101" pitchFamily="18" charset="-127"/>
-              </a:rPr>
-              <a:t>채팅봇의</a:t>
-            </a:r>
-            <a:r>
-              <a:rPr lang="ko-KR" altLang="en-US" sz="3200" dirty="0">
-                <a:latin typeface="HY견고딕" panose="02030600000101010101" pitchFamily="18" charset="-127"/>
-                <a:ea typeface="HY견고딕" panose="02030600000101010101" pitchFamily="18" charset="-127"/>
-              </a:rPr>
-              <a:t>  매크로 설정</a:t>
-            </a:r>
-            <a:endParaRPr lang="en-US" altLang="ko-KR" sz="3200" dirty="0">
-              <a:latin typeface="HY견고딕" panose="02030600000101010101" pitchFamily="18" charset="-127"/>
-              <a:ea typeface="HY견고딕" panose="02030600000101010101" pitchFamily="18" charset="-127"/>
-            </a:endParaRPr>
-          </a:p>
-          <a:p>
-            <a:endParaRPr lang="en-US" altLang="ko-KR" sz="3200" dirty="0">
-              <a:latin typeface="HY견고딕" panose="02030600000101010101" pitchFamily="18" charset="-127"/>
-              <a:ea typeface="HY견고딕" panose="02030600000101010101" pitchFamily="18" charset="-127"/>
-            </a:endParaRPr>
-          </a:p>
-          <a:p>
-            <a:r>
-              <a:rPr lang="ko-KR" altLang="en-US" sz="3200" dirty="0">
-                <a:latin typeface="HY견고딕" panose="02030600000101010101" pitchFamily="18" charset="-127"/>
-                <a:ea typeface="HY견고딕" panose="02030600000101010101" pitchFamily="18" charset="-127"/>
-              </a:rPr>
-              <a:t>명령어 </a:t>
-            </a:r>
-            <a:r>
-              <a:rPr lang="en-US" altLang="ko-KR" sz="3200" dirty="0">
-                <a:latin typeface="HY견고딕" panose="02030600000101010101" pitchFamily="18" charset="-127"/>
-                <a:ea typeface="HY견고딕" panose="02030600000101010101" pitchFamily="18" charset="-127"/>
-              </a:rPr>
-              <a:t>- </a:t>
-            </a:r>
-            <a:r>
-              <a:rPr lang="ko-KR" altLang="en-US" sz="3200" dirty="0">
-                <a:latin typeface="HY견고딕" panose="02030600000101010101" pitchFamily="18" charset="-127"/>
-                <a:ea typeface="HY견고딕" panose="02030600000101010101" pitchFamily="18" charset="-127"/>
-              </a:rPr>
-              <a:t>버스</a:t>
-            </a:r>
-            <a:endParaRPr lang="en-US" altLang="ko-KR" sz="3200" dirty="0">
-              <a:latin typeface="HY견고딕" panose="02030600000101010101" pitchFamily="18" charset="-127"/>
-              <a:ea typeface="HY견고딕" panose="02030600000101010101" pitchFamily="18" charset="-127"/>
-            </a:endParaRPr>
-          </a:p>
-        </p:txBody>
-      </p:sp>
-      <p:sp>
-        <p:nvSpPr>
-          <p:cNvPr id="2" name="TextBox 1">
+      <p:pic>
+        <p:nvPicPr>
+          <p:cNvPr id="13320" name="Picture 8" descr="https://cdn.discordapp.com/attachments/424058557609148418/1051532952275800174/image.png"/>
+          <p:cNvPicPr>
+            <a:picLocks noChangeAspect="1" noChangeArrowheads="1"/>
+          </p:cNvPicPr>
+          <p:nvPr/>
+        </p:nvPicPr>
+        <p:blipFill rotWithShape="1">
+          <a:blip r:embed="rId3">
             <a:extLst>
-              <a:ext uri="{FF2B5EF4-FFF2-40B4-BE49-F238E27FC236}">
-                <a16:creationId xmlns:a16="http://schemas.microsoft.com/office/drawing/2014/main" id="{3346B4FB-01F7-DBE2-FF7B-26FC1934BEDC}"/>
+              <a:ext uri="{28A0092B-C50C-407E-A947-70E740481C1C}">
+                <a14:useLocalDpi xmlns:a14="http://schemas.microsoft.com/office/drawing/2010/main" val="0"/>
               </a:ext>
             </a:extLst>
-          </p:cNvPr>
-          <p:cNvSpPr txBox="1"/>
-          <p:nvPr/>
-        </p:nvSpPr>
-        <p:spPr>
-          <a:xfrm>
-            <a:off x="6251975" y="579094"/>
-            <a:ext cx="3374664" cy="461665"/>
+          </a:blip>
+          <a:srcRect r="5908"/>
+          <a:stretch/>
+        </p:blipFill>
+        <p:spPr bwMode="auto">
+          <a:xfrm>
+            <a:off x="6629401" y="1355636"/>
+            <a:ext cx="5460999" cy="3523958"/>
           </a:xfrm>
           <a:prstGeom prst="rect">
             <a:avLst/>
           </a:prstGeom>
           <a:noFill/>
-        </p:spPr>
-        <p:txBody>
-          <a:bodyPr wrap="square" rtlCol="0">
-            <a:spAutoFit/>
-          </a:bodyPr>
-          <a:lstStyle/>
-          <a:p>
-            <a:pPr fontAlgn="base"/>
-            <a:r>
-              <a:rPr lang="en-US" altLang="ko-KR" sz="2400" dirty="0" err="1">
-                <a:latin typeface="HY견고딕" panose="02030600000101010101" pitchFamily="18" charset="-127"/>
-                <a:ea typeface="HY견고딕" panose="02030600000101010101" pitchFamily="18" charset="-127"/>
-              </a:rPr>
-              <a:t>Telegram.code</a:t>
-            </a:r>
-            <a:endParaRPr lang="en-US" altLang="ko-KR" sz="2400" dirty="0">
-              <a:latin typeface="HY견고딕" panose="02030600000101010101" pitchFamily="18" charset="-127"/>
-              <a:ea typeface="HY견고딕" panose="02030600000101010101" pitchFamily="18" charset="-127"/>
-            </a:endParaRPr>
-          </a:p>
-        </p:txBody>
-      </p:sp>
+          <a:extLst>
+            <a:ext uri="{909E8E84-426E-40DD-AFC4-6F175D3DCCD1}">
+              <a14:hiddenFill xmlns:a14="http://schemas.microsoft.com/office/drawing/2010/main">
+                <a:solidFill>
+                  <a:srgbClr val="FFFFFF"/>
+                </a:solidFill>
+              </a14:hiddenFill>
+            </a:ext>
+          </a:extLst>
+        </p:spPr>
+      </p:pic>
     </p:spTree>
     <p:extLst>
       <p:ext uri="{BB962C8B-B14F-4D97-AF65-F5344CB8AC3E}">
-        <p14:creationId xmlns:p14="http://schemas.microsoft.com/office/powerpoint/2010/main" val="98242796"/>
+        <p14:creationId xmlns:p14="http://schemas.microsoft.com/office/powerpoint/2010/main" val="3156602892"/>
       </p:ext>
     </p:extLst>
   </p:cSld>
@@ -4406,32 +4353,62 @@
                 <a:latin typeface="HY견고딕" panose="02030600000101010101" pitchFamily="18" charset="-127"/>
                 <a:ea typeface="HY견고딕" panose="02030600000101010101" pitchFamily="18" charset="-127"/>
               </a:rPr>
-              <a:t>Telegram </a:t>
-            </a:r>
-            <a:r>
-              <a:rPr lang="ko-KR" altLang="en-US" sz="4000" dirty="0">
-                <a:latin typeface="HY견고딕" panose="02030600000101010101" pitchFamily="18" charset="-127"/>
-                <a:ea typeface="HY견고딕" panose="02030600000101010101" pitchFamily="18" charset="-127"/>
-              </a:rPr>
-              <a:t>동작</a:t>
-            </a:r>
-            <a:endParaRPr lang="en-US" altLang="ko-KR" sz="4000" dirty="0">
-              <a:latin typeface="HY견고딕" panose="02030600000101010101" pitchFamily="18" charset="-127"/>
-              <a:ea typeface="HY견고딕" panose="02030600000101010101" pitchFamily="18" charset="-127"/>
-            </a:endParaRPr>
-          </a:p>
-        </p:txBody>
-      </p:sp>
-      <p:sp>
-        <p:nvSpPr>
-          <p:cNvPr id="7" name="TextBox 6"/>
+              <a:t>Telegram bot</a:t>
+            </a:r>
+          </a:p>
+        </p:txBody>
+      </p:sp>
+      <p:pic>
+        <p:nvPicPr>
+          <p:cNvPr id="11266" name="Picture 2" descr="https://cdn.discordapp.com/attachments/424058557609148418/1051534318356410368/image.png"/>
+          <p:cNvPicPr>
+            <a:picLocks noChangeAspect="1" noChangeArrowheads="1"/>
+          </p:cNvPicPr>
+          <p:nvPr/>
+        </p:nvPicPr>
+        <p:blipFill>
+          <a:blip r:embed="rId2">
+            <a:extLst>
+              <a:ext uri="{28A0092B-C50C-407E-A947-70E740481C1C}">
+                <a14:useLocalDpi xmlns:a14="http://schemas.microsoft.com/office/drawing/2010/main" val="0"/>
+              </a:ext>
+            </a:extLst>
+          </a:blip>
+          <a:srcRect/>
+          <a:stretch>
+            <a:fillRect/>
+          </a:stretch>
+        </p:blipFill>
+        <p:spPr bwMode="auto">
+          <a:xfrm>
+            <a:off x="675402" y="1187115"/>
+            <a:ext cx="6200775" cy="4972050"/>
+          </a:xfrm>
+          <a:prstGeom prst="rect">
+            <a:avLst/>
+          </a:prstGeom>
+          <a:noFill/>
+          <a:extLst>
+            <a:ext uri="{909E8E84-426E-40DD-AFC4-6F175D3DCCD1}">
+              <a14:hiddenFill xmlns:a14="http://schemas.microsoft.com/office/drawing/2010/main">
+                <a:solidFill>
+                  <a:srgbClr val="FFFFFF"/>
+                </a:solidFill>
+              </a14:hiddenFill>
+            </a:ext>
+          </a:extLst>
+        </p:spPr>
+      </p:pic>
+      <p:sp>
+        <p:nvSpPr>
+          <p:cNvPr id="8" name="TextBox 7"/>
           <p:cNvSpPr txBox="1"/>
           <p:nvPr/>
         </p:nvSpPr>
         <p:spPr>
           <a:xfrm>
-            <a:off x="6648450" y="1333500"/>
-            <a:ext cx="4429125" cy="1077218"/>
+            <a:off x="7115175" y="2642088"/>
+            <a:ext cx="4581525" cy="2062103"/>
           </a:xfrm>
           <a:prstGeom prst="rect">
             <a:avLst/>
@@ -4456,56 +4433,102 @@
                 <a:latin typeface="HY견고딕" panose="02030600000101010101" pitchFamily="18" charset="-127"/>
                 <a:ea typeface="HY견고딕" panose="02030600000101010101" pitchFamily="18" charset="-127"/>
               </a:rPr>
-              <a:t>챗봇과의</a:t>
+              <a:t>채팅봇의</a:t>
             </a:r>
             <a:r>
               <a:rPr lang="ko-KR" altLang="en-US" sz="3200" dirty="0">
                 <a:latin typeface="HY견고딕" panose="02030600000101010101" pitchFamily="18" charset="-127"/>
                 <a:ea typeface="HY견고딕" panose="02030600000101010101" pitchFamily="18" charset="-127"/>
               </a:rPr>
-              <a:t> 대화</a:t>
+              <a:t>  매크로 설정</a:t>
             </a:r>
             <a:endParaRPr lang="en-US" altLang="ko-KR" sz="3200" dirty="0">
               <a:latin typeface="HY견고딕" panose="02030600000101010101" pitchFamily="18" charset="-127"/>
               <a:ea typeface="HY견고딕" panose="02030600000101010101" pitchFamily="18" charset="-127"/>
             </a:endParaRPr>
           </a:p>
-        </p:txBody>
-      </p:sp>
-      <p:pic>
-        <p:nvPicPr>
-          <p:cNvPr id="5" name="그림 4">
+          <a:p>
+            <a:endParaRPr lang="en-US" altLang="ko-KR" sz="3200" dirty="0">
+              <a:latin typeface="HY견고딕" panose="02030600000101010101" pitchFamily="18" charset="-127"/>
+              <a:ea typeface="HY견고딕" panose="02030600000101010101" pitchFamily="18" charset="-127"/>
+            </a:endParaRPr>
+          </a:p>
+          <a:p>
+            <a:r>
+              <a:rPr lang="ko-KR" altLang="en-US" sz="3200" dirty="0">
+                <a:latin typeface="HY견고딕" panose="02030600000101010101" pitchFamily="18" charset="-127"/>
+                <a:ea typeface="HY견고딕" panose="02030600000101010101" pitchFamily="18" charset="-127"/>
+              </a:rPr>
+              <a:t>명령어 </a:t>
+            </a:r>
+            <a:r>
+              <a:rPr lang="en-US" altLang="ko-KR" sz="3200" dirty="0">
+                <a:latin typeface="HY견고딕" panose="02030600000101010101" pitchFamily="18" charset="-127"/>
+                <a:ea typeface="HY견고딕" panose="02030600000101010101" pitchFamily="18" charset="-127"/>
+              </a:rPr>
+              <a:t>- </a:t>
+            </a:r>
+            <a:r>
+              <a:rPr lang="ko-KR" altLang="en-US" sz="3200" dirty="0">
+                <a:latin typeface="HY견고딕" panose="02030600000101010101" pitchFamily="18" charset="-127"/>
+                <a:ea typeface="HY견고딕" panose="02030600000101010101" pitchFamily="18" charset="-127"/>
+              </a:rPr>
+              <a:t>버스</a:t>
+            </a:r>
+            <a:endParaRPr lang="en-US" altLang="ko-KR" sz="3200" dirty="0">
+              <a:latin typeface="HY견고딕" panose="02030600000101010101" pitchFamily="18" charset="-127"/>
+              <a:ea typeface="HY견고딕" panose="02030600000101010101" pitchFamily="18" charset="-127"/>
+            </a:endParaRPr>
+          </a:p>
+        </p:txBody>
+      </p:sp>
+      <p:sp>
+        <p:nvSpPr>
+          <p:cNvPr id="2" name="TextBox 1">
             <a:extLst>
               <a:ext uri="{FF2B5EF4-FFF2-40B4-BE49-F238E27FC236}">
-                <a16:creationId xmlns:a16="http://schemas.microsoft.com/office/drawing/2014/main" id="{30D59503-E45B-43B6-5137-0EF0DA8CCC36}"/>
+                <a16:creationId xmlns:a16="http://schemas.microsoft.com/office/drawing/2014/main" id="{3346B4FB-01F7-DBE2-FF7B-26FC1934BEDC}"/>
               </a:ext>
             </a:extLst>
           </p:cNvPr>
-          <p:cNvPicPr>
-            <a:picLocks noChangeAspect="1"/>
-          </p:cNvPicPr>
-          <p:nvPr/>
-        </p:nvPicPr>
-        <p:blipFill>
-          <a:blip r:embed="rId2"/>
-          <a:stretch>
-            <a:fillRect/>
-          </a:stretch>
-        </p:blipFill>
-        <p:spPr>
-          <a:xfrm>
-            <a:off x="2090057" y="1203649"/>
-            <a:ext cx="3916265" cy="5162766"/>
-          </a:xfrm>
-          <a:prstGeom prst="rect">
-            <a:avLst/>
-          </a:prstGeom>
-        </p:spPr>
-      </p:pic>
+          <p:cNvSpPr txBox="1"/>
+          <p:nvPr/>
+        </p:nvSpPr>
+        <p:spPr>
+          <a:xfrm>
+            <a:off x="6251975" y="579094"/>
+            <a:ext cx="3374664" cy="461665"/>
+          </a:xfrm>
+          <a:prstGeom prst="rect">
+            <a:avLst/>
+          </a:prstGeom>
+          <a:noFill/>
+        </p:spPr>
+        <p:txBody>
+          <a:bodyPr wrap="square" rtlCol="0">
+            <a:spAutoFit/>
+          </a:bodyPr>
+          <a:lstStyle/>
+          <a:p>
+            <a:pPr fontAlgn="base"/>
+            <a:r>
+              <a:rPr lang="en-US" altLang="ko-KR" sz="2400" dirty="0" err="1">
+                <a:latin typeface="HY견고딕" panose="02030600000101010101" pitchFamily="18" charset="-127"/>
+                <a:ea typeface="HY견고딕" panose="02030600000101010101" pitchFamily="18" charset="-127"/>
+              </a:rPr>
+              <a:t>Telegram.code</a:t>
+            </a:r>
+            <a:endParaRPr lang="en-US" altLang="ko-KR" sz="2400" dirty="0">
+              <a:latin typeface="HY견고딕" panose="02030600000101010101" pitchFamily="18" charset="-127"/>
+              <a:ea typeface="HY견고딕" panose="02030600000101010101" pitchFamily="18" charset="-127"/>
+            </a:endParaRPr>
+          </a:p>
+        </p:txBody>
+      </p:sp>
     </p:spTree>
     <p:extLst>
       <p:ext uri="{BB962C8B-B14F-4D97-AF65-F5344CB8AC3E}">
-        <p14:creationId xmlns:p14="http://schemas.microsoft.com/office/powerpoint/2010/main" val="3714926815"/>
+        <p14:creationId xmlns:p14="http://schemas.microsoft.com/office/powerpoint/2010/main" val="98242796"/>
       </p:ext>
     </p:extLst>
   </p:cSld>
@@ -4691,7 +4714,7 @@
                   <a:schemeClr val="bg1"/>
                 </a:solidFill>
               </a:rPr>
-              <a:t>3</a:t>
+              <a:t>2</a:t>
             </a:r>
             <a:endParaRPr lang="ko-KR" altLang="en-US" sz="3200" b="1" dirty="0">
               <a:solidFill>
@@ -4728,8 +4751,19 @@
                 <a:latin typeface="HY견고딕" panose="02030600000101010101" pitchFamily="18" charset="-127"/>
                 <a:ea typeface="HY견고딕" panose="02030600000101010101" pitchFamily="18" charset="-127"/>
               </a:rPr>
-              <a:t>Trouble Shooting</a:t>
-            </a:r>
+              <a:t>Telegram </a:t>
+            </a:r>
+            <a:r>
+              <a:rPr lang="ko-KR" altLang="en-US" sz="4000" dirty="0">
+                <a:latin typeface="HY견고딕" panose="02030600000101010101" pitchFamily="18" charset="-127"/>
+                <a:ea typeface="HY견고딕" panose="02030600000101010101" pitchFamily="18" charset="-127"/>
+              </a:rPr>
+              <a:t>동작</a:t>
+            </a:r>
+            <a:endParaRPr lang="en-US" altLang="ko-KR" sz="4000" dirty="0">
+              <a:latin typeface="HY견고딕" panose="02030600000101010101" pitchFamily="18" charset="-127"/>
+              <a:ea typeface="HY견고딕" panose="02030600000101010101" pitchFamily="18" charset="-127"/>
+            </a:endParaRPr>
           </a:p>
         </p:txBody>
       </p:sp>
@@ -4741,8 +4775,8 @@
         </p:nvSpPr>
         <p:spPr>
           <a:xfrm>
-            <a:off x="6648450" y="1333500"/>
-            <a:ext cx="4581525" cy="4031873"/>
+            <a:off x="6648450" y="1660072"/>
+            <a:ext cx="4429125" cy="1077218"/>
           </a:xfrm>
           <a:prstGeom prst="rect">
             <a:avLst/>
@@ -4756,146 +4790,67 @@
           <a:lstStyle/>
           <a:p>
             <a:r>
-              <a:rPr lang="en-US" altLang="ko-KR" sz="3200" dirty="0" err="1">
-                <a:latin typeface="HY견고딕" panose="02030600000101010101" pitchFamily="18" charset="-127"/>
-                <a:ea typeface="HY견고딕" panose="02030600000101010101" pitchFamily="18" charset="-127"/>
-              </a:rPr>
-              <a:t>Json</a:t>
-            </a:r>
-            <a:r>
               <a:rPr lang="en-US" altLang="ko-KR" sz="3200" dirty="0">
                 <a:latin typeface="HY견고딕" panose="02030600000101010101" pitchFamily="18" charset="-127"/>
                 <a:ea typeface="HY견고딕" panose="02030600000101010101" pitchFamily="18" charset="-127"/>
               </a:rPr>
-              <a:t> </a:t>
+              <a:t>Telegram </a:t>
+            </a:r>
+            <a:r>
+              <a:rPr lang="ko-KR" altLang="en-US" sz="3200" dirty="0" err="1">
+                <a:latin typeface="HY견고딕" panose="02030600000101010101" pitchFamily="18" charset="-127"/>
+                <a:ea typeface="HY견고딕" panose="02030600000101010101" pitchFamily="18" charset="-127"/>
+              </a:rPr>
+              <a:t>챗봇과의</a:t>
             </a:r>
             <a:r>
               <a:rPr lang="ko-KR" altLang="en-US" sz="3200" dirty="0">
                 <a:latin typeface="HY견고딕" panose="02030600000101010101" pitchFamily="18" charset="-127"/>
                 <a:ea typeface="HY견고딕" panose="02030600000101010101" pitchFamily="18" charset="-127"/>
               </a:rPr>
-              <a:t>파일을 각각 </a:t>
-            </a:r>
-            <a:r>
-              <a:rPr lang="en-US" altLang="ko-KR" sz="3200" dirty="0" err="1">
-                <a:latin typeface="HY견고딕" panose="02030600000101010101" pitchFamily="18" charset="-127"/>
-                <a:ea typeface="HY견고딕" panose="02030600000101010101" pitchFamily="18" charset="-127"/>
-              </a:rPr>
-              <a:t>busNo</a:t>
-            </a:r>
-            <a:r>
-              <a:rPr lang="en-US" altLang="ko-KR" sz="3200" dirty="0">
-                <a:latin typeface="HY견고딕" panose="02030600000101010101" pitchFamily="18" charset="-127"/>
-                <a:ea typeface="HY견고딕" panose="02030600000101010101" pitchFamily="18" charset="-127"/>
-              </a:rPr>
-              <a:t>, first, second</a:t>
-            </a:r>
-            <a:r>
-              <a:rPr lang="ko-KR" altLang="en-US" sz="3200" dirty="0">
-                <a:latin typeface="HY견고딕" panose="02030600000101010101" pitchFamily="18" charset="-127"/>
-                <a:ea typeface="HY견고딕" panose="02030600000101010101" pitchFamily="18" charset="-127"/>
-              </a:rPr>
-              <a:t>의 배열로 저장하여 등록하려 했으나 </a:t>
-            </a:r>
-            <a:r>
-              <a:rPr lang="en-US" altLang="ko-KR" sz="3200" dirty="0">
-                <a:latin typeface="HY견고딕" panose="02030600000101010101" pitchFamily="18" charset="-127"/>
-                <a:ea typeface="HY견고딕" panose="02030600000101010101" pitchFamily="18" charset="-127"/>
-              </a:rPr>
-              <a:t>buses </a:t>
-            </a:r>
-            <a:r>
-              <a:rPr lang="ko-KR" altLang="en-US" sz="3200" dirty="0">
-                <a:latin typeface="HY견고딕" panose="02030600000101010101" pitchFamily="18" charset="-127"/>
-                <a:ea typeface="HY견고딕" panose="02030600000101010101" pitchFamily="18" charset="-127"/>
-              </a:rPr>
-              <a:t>배열에 넣어주려 했으나 실패해서</a:t>
+              <a:t> 대화</a:t>
             </a:r>
             <a:endParaRPr lang="en-US" altLang="ko-KR" sz="3200" dirty="0">
               <a:latin typeface="HY견고딕" panose="02030600000101010101" pitchFamily="18" charset="-127"/>
               <a:ea typeface="HY견고딕" panose="02030600000101010101" pitchFamily="18" charset="-127"/>
             </a:endParaRPr>
           </a:p>
-          <a:p>
-            <a:r>
-              <a:rPr lang="ko-KR" altLang="en-US" sz="3200" dirty="0">
-                <a:latin typeface="HY견고딕" panose="02030600000101010101" pitchFamily="18" charset="-127"/>
-                <a:ea typeface="HY견고딕" panose="02030600000101010101" pitchFamily="18" charset="-127"/>
-              </a:rPr>
-              <a:t>분할로 </a:t>
-            </a:r>
-            <a:r>
-              <a:rPr lang="en-US" altLang="ko-KR" sz="3200" dirty="0">
-                <a:latin typeface="HY견고딕" panose="02030600000101010101" pitchFamily="18" charset="-127"/>
-                <a:ea typeface="HY견고딕" panose="02030600000101010101" pitchFamily="18" charset="-127"/>
-              </a:rPr>
-              <a:t>append </a:t>
-            </a:r>
-            <a:r>
-              <a:rPr lang="ko-KR" altLang="en-US" sz="3200" dirty="0">
-                <a:latin typeface="HY견고딕" panose="02030600000101010101" pitchFamily="18" charset="-127"/>
-                <a:ea typeface="HY견고딕" panose="02030600000101010101" pitchFamily="18" charset="-127"/>
-              </a:rPr>
-              <a:t>함</a:t>
-            </a:r>
-            <a:endParaRPr lang="en-US" altLang="ko-KR" sz="3200" dirty="0">
-              <a:latin typeface="HY견고딕" panose="02030600000101010101" pitchFamily="18" charset="-127"/>
-              <a:ea typeface="HY견고딕" panose="02030600000101010101" pitchFamily="18" charset="-127"/>
-            </a:endParaRPr>
-          </a:p>
-          <a:p>
-            <a:endParaRPr lang="en-US" altLang="ko-KR" sz="3200" dirty="0">
-              <a:latin typeface="HY견고딕" panose="02030600000101010101" pitchFamily="18" charset="-127"/>
-              <a:ea typeface="HY견고딕" panose="02030600000101010101" pitchFamily="18" charset="-127"/>
-            </a:endParaRPr>
-          </a:p>
         </p:txBody>
       </p:sp>
       <p:pic>
         <p:nvPicPr>
-          <p:cNvPr id="8" name="Picture 6" descr="https://cdn.discordapp.com/attachments/424058557609148418/1051528886313295903/image.png"/>
+          <p:cNvPr id="5" name="그림 4">
+            <a:extLst>
+              <a:ext uri="{FF2B5EF4-FFF2-40B4-BE49-F238E27FC236}">
+                <a16:creationId xmlns:a16="http://schemas.microsoft.com/office/drawing/2014/main" id="{30D59503-E45B-43B6-5137-0EF0DA8CCC36}"/>
+              </a:ext>
+            </a:extLst>
+          </p:cNvPr>
           <p:cNvPicPr>
-            <a:picLocks noChangeAspect="1" noChangeArrowheads="1"/>
+            <a:picLocks noChangeAspect="1"/>
           </p:cNvPicPr>
           <p:nvPr/>
         </p:nvPicPr>
         <p:blipFill>
-          <a:blip r:embed="rId2">
-            <a:extLst>
-              <a:ext uri="{28A0092B-C50C-407E-A947-70E740481C1C}">
-                <a14:useLocalDpi xmlns:a14="http://schemas.microsoft.com/office/drawing/2010/main" val="0"/>
-              </a:ext>
-            </a:extLst>
-          </a:blip>
-          <a:srcRect/>
+          <a:blip r:embed="rId2"/>
           <a:stretch>
             <a:fillRect/>
           </a:stretch>
         </p:blipFill>
-        <p:spPr bwMode="auto">
-          <a:xfrm>
-            <a:off x="749440" y="1333500"/>
-            <a:ext cx="5219700" cy="4772025"/>
-          </a:xfrm>
-          <a:prstGeom prst="rect">
-            <a:avLst/>
-          </a:prstGeom>
-          <a:noFill/>
-          <a:extLst>
-            <a:ext uri="{909E8E84-426E-40DD-AFC4-6F175D3DCCD1}">
-              <a14:hiddenFill xmlns:a14="http://schemas.microsoft.com/office/drawing/2010/main">
-                <a:solidFill>
-                  <a:srgbClr val="FFFFFF"/>
-                </a:solidFill>
-              </a14:hiddenFill>
-            </a:ext>
-          </a:extLst>
+        <p:spPr>
+          <a:xfrm>
+            <a:off x="1396360" y="1194320"/>
+            <a:ext cx="3916265" cy="5162766"/>
+          </a:xfrm>
+          <a:prstGeom prst="rect">
+            <a:avLst/>
+          </a:prstGeom>
         </p:spPr>
       </p:pic>
     </p:spTree>
     <p:extLst>
       <p:ext uri="{BB962C8B-B14F-4D97-AF65-F5344CB8AC3E}">
-        <p14:creationId xmlns:p14="http://schemas.microsoft.com/office/powerpoint/2010/main" val="346101799"/>
+        <p14:creationId xmlns:p14="http://schemas.microsoft.com/office/powerpoint/2010/main" val="3714926815"/>
       </p:ext>
     </p:extLst>
   </p:cSld>
@@ -5132,6 +5087,396 @@
         <p:spPr>
           <a:xfrm>
             <a:off x="6648450" y="1333500"/>
+            <a:ext cx="4581525" cy="4031873"/>
+          </a:xfrm>
+          <a:prstGeom prst="rect">
+            <a:avLst/>
+          </a:prstGeom>
+          <a:noFill/>
+        </p:spPr>
+        <p:txBody>
+          <a:bodyPr wrap="square" rtlCol="0">
+            <a:spAutoFit/>
+          </a:bodyPr>
+          <a:lstStyle/>
+          <a:p>
+            <a:r>
+              <a:rPr lang="en-US" altLang="ko-KR" sz="3200" dirty="0" err="1">
+                <a:latin typeface="HY견고딕" panose="02030600000101010101" pitchFamily="18" charset="-127"/>
+                <a:ea typeface="HY견고딕" panose="02030600000101010101" pitchFamily="18" charset="-127"/>
+              </a:rPr>
+              <a:t>Json</a:t>
+            </a:r>
+            <a:r>
+              <a:rPr lang="en-US" altLang="ko-KR" sz="3200" dirty="0">
+                <a:latin typeface="HY견고딕" panose="02030600000101010101" pitchFamily="18" charset="-127"/>
+                <a:ea typeface="HY견고딕" panose="02030600000101010101" pitchFamily="18" charset="-127"/>
+              </a:rPr>
+              <a:t> </a:t>
+            </a:r>
+            <a:r>
+              <a:rPr lang="ko-KR" altLang="en-US" sz="3200" dirty="0">
+                <a:latin typeface="HY견고딕" panose="02030600000101010101" pitchFamily="18" charset="-127"/>
+                <a:ea typeface="HY견고딕" panose="02030600000101010101" pitchFamily="18" charset="-127"/>
+              </a:rPr>
+              <a:t>파일을 각각 </a:t>
+            </a:r>
+            <a:r>
+              <a:rPr lang="en-US" altLang="ko-KR" sz="3200" dirty="0" err="1">
+                <a:latin typeface="HY견고딕" panose="02030600000101010101" pitchFamily="18" charset="-127"/>
+                <a:ea typeface="HY견고딕" panose="02030600000101010101" pitchFamily="18" charset="-127"/>
+              </a:rPr>
+              <a:t>busNo</a:t>
+            </a:r>
+            <a:r>
+              <a:rPr lang="en-US" altLang="ko-KR" sz="3200" dirty="0">
+                <a:latin typeface="HY견고딕" panose="02030600000101010101" pitchFamily="18" charset="-127"/>
+                <a:ea typeface="HY견고딕" panose="02030600000101010101" pitchFamily="18" charset="-127"/>
+              </a:rPr>
+              <a:t>, first, second</a:t>
+            </a:r>
+            <a:r>
+              <a:rPr lang="ko-KR" altLang="en-US" sz="3200" dirty="0">
+                <a:latin typeface="HY견고딕" panose="02030600000101010101" pitchFamily="18" charset="-127"/>
+                <a:ea typeface="HY견고딕" panose="02030600000101010101" pitchFamily="18" charset="-127"/>
+              </a:rPr>
+              <a:t>의 배열로 저장하여 등록하려 했으나 </a:t>
+            </a:r>
+            <a:r>
+              <a:rPr lang="en-US" altLang="ko-KR" sz="3200" dirty="0">
+                <a:latin typeface="HY견고딕" panose="02030600000101010101" pitchFamily="18" charset="-127"/>
+                <a:ea typeface="HY견고딕" panose="02030600000101010101" pitchFamily="18" charset="-127"/>
+              </a:rPr>
+              <a:t>buses </a:t>
+            </a:r>
+            <a:r>
+              <a:rPr lang="ko-KR" altLang="en-US" sz="3200" dirty="0">
+                <a:latin typeface="HY견고딕" panose="02030600000101010101" pitchFamily="18" charset="-127"/>
+                <a:ea typeface="HY견고딕" panose="02030600000101010101" pitchFamily="18" charset="-127"/>
+              </a:rPr>
+              <a:t>배열에 넣어주려 했으나 실패해서</a:t>
+            </a:r>
+            <a:endParaRPr lang="en-US" altLang="ko-KR" sz="3200" dirty="0">
+              <a:latin typeface="HY견고딕" panose="02030600000101010101" pitchFamily="18" charset="-127"/>
+              <a:ea typeface="HY견고딕" panose="02030600000101010101" pitchFamily="18" charset="-127"/>
+            </a:endParaRPr>
+          </a:p>
+          <a:p>
+            <a:r>
+              <a:rPr lang="ko-KR" altLang="en-US" sz="3200" dirty="0">
+                <a:latin typeface="HY견고딕" panose="02030600000101010101" pitchFamily="18" charset="-127"/>
+                <a:ea typeface="HY견고딕" panose="02030600000101010101" pitchFamily="18" charset="-127"/>
+              </a:rPr>
+              <a:t>분할로 </a:t>
+            </a:r>
+            <a:r>
+              <a:rPr lang="en-US" altLang="ko-KR" sz="3200" dirty="0">
+                <a:latin typeface="HY견고딕" panose="02030600000101010101" pitchFamily="18" charset="-127"/>
+                <a:ea typeface="HY견고딕" panose="02030600000101010101" pitchFamily="18" charset="-127"/>
+              </a:rPr>
+              <a:t>append </a:t>
+            </a:r>
+            <a:r>
+              <a:rPr lang="ko-KR" altLang="en-US" sz="3200" dirty="0">
+                <a:latin typeface="HY견고딕" panose="02030600000101010101" pitchFamily="18" charset="-127"/>
+                <a:ea typeface="HY견고딕" panose="02030600000101010101" pitchFamily="18" charset="-127"/>
+              </a:rPr>
+              <a:t>함</a:t>
+            </a:r>
+            <a:endParaRPr lang="en-US" altLang="ko-KR" sz="3200" dirty="0">
+              <a:latin typeface="HY견고딕" panose="02030600000101010101" pitchFamily="18" charset="-127"/>
+              <a:ea typeface="HY견고딕" panose="02030600000101010101" pitchFamily="18" charset="-127"/>
+            </a:endParaRPr>
+          </a:p>
+          <a:p>
+            <a:endParaRPr lang="en-US" altLang="ko-KR" sz="3200" dirty="0">
+              <a:latin typeface="HY견고딕" panose="02030600000101010101" pitchFamily="18" charset="-127"/>
+              <a:ea typeface="HY견고딕" panose="02030600000101010101" pitchFamily="18" charset="-127"/>
+            </a:endParaRPr>
+          </a:p>
+        </p:txBody>
+      </p:sp>
+      <p:pic>
+        <p:nvPicPr>
+          <p:cNvPr id="8" name="Picture 6" descr="https://cdn.discordapp.com/attachments/424058557609148418/1051528886313295903/image.png"/>
+          <p:cNvPicPr>
+            <a:picLocks noChangeAspect="1" noChangeArrowheads="1"/>
+          </p:cNvPicPr>
+          <p:nvPr/>
+        </p:nvPicPr>
+        <p:blipFill>
+          <a:blip r:embed="rId2">
+            <a:extLst>
+              <a:ext uri="{28A0092B-C50C-407E-A947-70E740481C1C}">
+                <a14:useLocalDpi xmlns:a14="http://schemas.microsoft.com/office/drawing/2010/main" val="0"/>
+              </a:ext>
+            </a:extLst>
+          </a:blip>
+          <a:srcRect/>
+          <a:stretch>
+            <a:fillRect/>
+          </a:stretch>
+        </p:blipFill>
+        <p:spPr bwMode="auto">
+          <a:xfrm>
+            <a:off x="749440" y="1333500"/>
+            <a:ext cx="5219700" cy="4772025"/>
+          </a:xfrm>
+          <a:prstGeom prst="rect">
+            <a:avLst/>
+          </a:prstGeom>
+          <a:noFill/>
+          <a:extLst>
+            <a:ext uri="{909E8E84-426E-40DD-AFC4-6F175D3DCCD1}">
+              <a14:hiddenFill xmlns:a14="http://schemas.microsoft.com/office/drawing/2010/main">
+                <a:solidFill>
+                  <a:srgbClr val="FFFFFF"/>
+                </a:solidFill>
+              </a14:hiddenFill>
+            </a:ext>
+          </a:extLst>
+        </p:spPr>
+      </p:pic>
+    </p:spTree>
+    <p:extLst>
+      <p:ext uri="{BB962C8B-B14F-4D97-AF65-F5344CB8AC3E}">
+        <p14:creationId xmlns:p14="http://schemas.microsoft.com/office/powerpoint/2010/main" val="346101799"/>
+      </p:ext>
+    </p:extLst>
+  </p:cSld>
+  <p:clrMapOvr>
+    <a:masterClrMapping/>
+  </p:clrMapOvr>
+</p:sld>
+</file>
+
+<file path=ppt/slides/slide14.xml><?xml version="1.0" encoding="utf-8"?>
+<p:sld xmlns:a="http://schemas.openxmlformats.org/drawingml/2006/main" xmlns:r="http://schemas.openxmlformats.org/officeDocument/2006/relationships" xmlns:p="http://schemas.openxmlformats.org/presentationml/2006/main">
+  <p:cSld>
+    <p:spTree>
+      <p:nvGrpSpPr>
+        <p:cNvPr id="1" name=""/>
+        <p:cNvGrpSpPr/>
+        <p:nvPr/>
+      </p:nvGrpSpPr>
+      <p:grpSpPr>
+        <a:xfrm>
+          <a:off x="0" y="0"/>
+          <a:ext cx="0" cy="0"/>
+          <a:chOff x="0" y="0"/>
+          <a:chExt cx="0" cy="0"/>
+        </a:xfrm>
+      </p:grpSpPr>
+      <p:sp>
+        <p:nvSpPr>
+          <p:cNvPr id="16" name="TextBox 15"/>
+          <p:cNvSpPr txBox="1"/>
+          <p:nvPr/>
+        </p:nvSpPr>
+        <p:spPr>
+          <a:xfrm>
+            <a:off x="9879006" y="6505575"/>
+            <a:ext cx="2242922" cy="215444"/>
+          </a:xfrm>
+          <a:prstGeom prst="rect">
+            <a:avLst/>
+          </a:prstGeom>
+          <a:noFill/>
+        </p:spPr>
+        <p:txBody>
+          <a:bodyPr wrap="none" rtlCol="0">
+            <a:spAutoFit/>
+          </a:bodyPr>
+          <a:lstStyle/>
+          <a:p>
+            <a:pPr algn="r"/>
+            <a:r>
+              <a:rPr lang="en-US" altLang="ko-KR" sz="800" dirty="0">
+                <a:solidFill>
+                  <a:schemeClr val="accent6"/>
+                </a:solidFill>
+                <a:latin typeface="+mn-ea"/>
+              </a:rPr>
+              <a:t>Copyrightⓒ. Saebyeol Yu. All Rights Reserved.</a:t>
+            </a:r>
+            <a:endParaRPr lang="ko-KR" altLang="en-US" sz="800" dirty="0">
+              <a:solidFill>
+                <a:schemeClr val="accent6"/>
+              </a:solidFill>
+              <a:latin typeface="+mn-ea"/>
+            </a:endParaRPr>
+          </a:p>
+        </p:txBody>
+      </p:sp>
+      <p:cxnSp>
+        <p:nvCxnSpPr>
+          <p:cNvPr id="17" name="직선 연결선 16"/>
+          <p:cNvCxnSpPr/>
+          <p:nvPr/>
+        </p:nvCxnSpPr>
+        <p:spPr>
+          <a:xfrm>
+            <a:off x="1188881" y="273124"/>
+            <a:ext cx="10666421" cy="0"/>
+          </a:xfrm>
+          <a:prstGeom prst="line">
+            <a:avLst/>
+          </a:prstGeom>
+          <a:ln w="19050">
+            <a:solidFill>
+              <a:schemeClr val="accent6"/>
+            </a:solidFill>
+          </a:ln>
+        </p:spPr>
+        <p:style>
+          <a:lnRef idx="1">
+            <a:schemeClr val="accent1"/>
+          </a:lnRef>
+          <a:fillRef idx="0">
+            <a:schemeClr val="accent1"/>
+          </a:fillRef>
+          <a:effectRef idx="0">
+            <a:schemeClr val="accent1"/>
+          </a:effectRef>
+          <a:fontRef idx="minor">
+            <a:schemeClr val="tx1"/>
+          </a:fontRef>
+        </p:style>
+      </p:cxnSp>
+      <p:sp>
+        <p:nvSpPr>
+          <p:cNvPr id="18" name="직사각형 17"/>
+          <p:cNvSpPr/>
+          <p:nvPr/>
+        </p:nvSpPr>
+        <p:spPr>
+          <a:xfrm>
+            <a:off x="265814" y="244548"/>
+            <a:ext cx="720000" cy="720000"/>
+          </a:xfrm>
+          <a:prstGeom prst="rect">
+            <a:avLst/>
+          </a:prstGeom>
+          <a:solidFill>
+            <a:schemeClr val="accent6">
+              <a:lumMod val="60000"/>
+              <a:lumOff val="40000"/>
+            </a:schemeClr>
+          </a:solidFill>
+          <a:ln>
+            <a:noFill/>
+          </a:ln>
+        </p:spPr>
+        <p:style>
+          <a:lnRef idx="2">
+            <a:schemeClr val="accent1">
+              <a:shade val="50000"/>
+            </a:schemeClr>
+          </a:lnRef>
+          <a:fillRef idx="1">
+            <a:schemeClr val="accent1"/>
+          </a:fillRef>
+          <a:effectRef idx="0">
+            <a:schemeClr val="accent1"/>
+          </a:effectRef>
+          <a:fontRef idx="minor">
+            <a:schemeClr val="lt1"/>
+          </a:fontRef>
+        </p:style>
+        <p:txBody>
+          <a:bodyPr rot="0" spcFirstLastPara="0" vertOverflow="overflow" horzOverflow="overflow" vert="horz" wrap="square" lIns="91440" tIns="45720" rIns="91440" bIns="45720" numCol="1" spcCol="0" rtlCol="0" fromWordArt="0" anchor="ctr" anchorCtr="0" forceAA="0" compatLnSpc="1">
+            <a:prstTxWarp prst="textNoShape">
+              <a:avLst/>
+            </a:prstTxWarp>
+            <a:noAutofit/>
+          </a:bodyPr>
+          <a:lstStyle/>
+          <a:p>
+            <a:pPr algn="ctr"/>
+            <a:endParaRPr lang="ko-KR" altLang="en-US"/>
+          </a:p>
+        </p:txBody>
+      </p:sp>
+      <p:sp>
+        <p:nvSpPr>
+          <p:cNvPr id="19" name="TextBox 18"/>
+          <p:cNvSpPr txBox="1"/>
+          <p:nvPr/>
+        </p:nvSpPr>
+        <p:spPr>
+          <a:xfrm>
+            <a:off x="490138" y="323244"/>
+            <a:ext cx="259302" cy="584775"/>
+          </a:xfrm>
+          <a:prstGeom prst="rect">
+            <a:avLst/>
+          </a:prstGeom>
+          <a:noFill/>
+        </p:spPr>
+        <p:txBody>
+          <a:bodyPr wrap="square" rtlCol="0">
+            <a:spAutoFit/>
+          </a:bodyPr>
+          <a:lstStyle/>
+          <a:p>
+            <a:pPr algn="ctr"/>
+            <a:r>
+              <a:rPr lang="en-US" altLang="ko-KR" sz="3200" b="1" dirty="0">
+                <a:solidFill>
+                  <a:schemeClr val="bg1"/>
+                </a:solidFill>
+              </a:rPr>
+              <a:t>3</a:t>
+            </a:r>
+            <a:endParaRPr lang="ko-KR" altLang="en-US" sz="3200" b="1" dirty="0">
+              <a:solidFill>
+                <a:schemeClr val="bg1"/>
+              </a:solidFill>
+            </a:endParaRPr>
+          </a:p>
+        </p:txBody>
+      </p:sp>
+      <p:sp>
+        <p:nvSpPr>
+          <p:cNvPr id="10" name="TextBox 9"/>
+          <p:cNvSpPr txBox="1"/>
+          <p:nvPr/>
+        </p:nvSpPr>
+        <p:spPr>
+          <a:xfrm>
+            <a:off x="1188881" y="317304"/>
+            <a:ext cx="5173819" cy="707886"/>
+          </a:xfrm>
+          <a:prstGeom prst="rect">
+            <a:avLst/>
+          </a:prstGeom>
+          <a:noFill/>
+        </p:spPr>
+        <p:txBody>
+          <a:bodyPr wrap="square" rtlCol="0">
+            <a:spAutoFit/>
+          </a:bodyPr>
+          <a:lstStyle/>
+          <a:p>
+            <a:r>
+              <a:rPr lang="en-US" altLang="ko-KR" sz="4000" dirty="0">
+                <a:latin typeface="HY견고딕" panose="02030600000101010101" pitchFamily="18" charset="-127"/>
+                <a:ea typeface="HY견고딕" panose="02030600000101010101" pitchFamily="18" charset="-127"/>
+              </a:rPr>
+              <a:t>Trouble Shooting</a:t>
+            </a:r>
+          </a:p>
+        </p:txBody>
+      </p:sp>
+      <p:sp>
+        <p:nvSpPr>
+          <p:cNvPr id="7" name="TextBox 6"/>
+          <p:cNvSpPr txBox="1"/>
+          <p:nvPr/>
+        </p:nvSpPr>
+        <p:spPr>
+          <a:xfrm>
+            <a:off x="6648450" y="1333500"/>
             <a:ext cx="4581525" cy="3539430"/>
           </a:xfrm>
           <a:prstGeom prst="rect">
@@ -5274,7 +5619,7 @@
 </p:sld>
 </file>
 
-<file path=ppt/slides/slide14.xml><?xml version="1.0" encoding="utf-8"?>
+<file path=ppt/slides/slide15.xml><?xml version="1.0" encoding="utf-8"?>
 <p:sld xmlns:a="http://schemas.openxmlformats.org/drawingml/2006/main" xmlns:r="http://schemas.openxmlformats.org/officeDocument/2006/relationships" xmlns:p="http://schemas.openxmlformats.org/presentationml/2006/main">
   <p:cSld>
     <p:bg>
@@ -5472,8 +5817,8 @@
         </p:nvSpPr>
         <p:spPr>
           <a:xfrm>
-            <a:off x="338006" y="344708"/>
-            <a:ext cx="1138453" cy="369332"/>
+            <a:off x="5456001" y="145989"/>
+            <a:ext cx="1723549" cy="1015663"/>
           </a:xfrm>
           <a:prstGeom prst="rect">
             <a:avLst/>
@@ -5487,18 +5832,13 @@
           <a:lstStyle/>
           <a:p>
             <a:r>
-              <a:rPr lang="en-US" altLang="ko-KR" b="1" dirty="0">
+              <a:rPr lang="ko-KR" altLang="en-US" sz="6000" b="1" dirty="0">
                 <a:solidFill>
                   <a:schemeClr val="bg1"/>
                 </a:solidFill>
               </a:rPr>
-              <a:t>Contents</a:t>
-            </a:r>
-            <a:endParaRPr lang="ko-KR" altLang="en-US" b="1" dirty="0">
-              <a:solidFill>
-                <a:schemeClr val="bg1"/>
-              </a:solidFill>
-            </a:endParaRPr>
+              <a:t>목차</a:t>
+            </a:r>
           </a:p>
         </p:txBody>
       </p:sp>
@@ -5510,22 +5850,22 @@
         </p:nvGrpSpPr>
         <p:grpSpPr>
           <a:xfrm>
-            <a:off x="212651" y="3568064"/>
-            <a:ext cx="10613543" cy="1068746"/>
-            <a:chOff x="212651" y="3206557"/>
-            <a:chExt cx="10613543" cy="1068746"/>
+            <a:off x="2217230" y="1474236"/>
+            <a:ext cx="5436104" cy="4367078"/>
+            <a:chOff x="2795719" y="1402712"/>
+            <a:chExt cx="5436104" cy="4367078"/>
           </a:xfrm>
         </p:grpSpPr>
         <p:sp>
           <p:nvSpPr>
-            <p:cNvPr id="9" name="TextBox 8"/>
+            <p:cNvPr id="24" name="TextBox 23"/>
             <p:cNvSpPr txBox="1"/>
             <p:nvPr/>
           </p:nvSpPr>
           <p:spPr>
             <a:xfrm>
-              <a:off x="586180" y="3575889"/>
-              <a:ext cx="3541394" cy="652486"/>
+              <a:off x="2832432" y="1402712"/>
+              <a:ext cx="4048319" cy="830997"/>
             </a:xfrm>
             <a:prstGeom prst="rect">
               <a:avLst/>
@@ -5538,65 +5878,27 @@
             </a:bodyPr>
             <a:lstStyle/>
             <a:p>
-              <a:pPr marL="180975" indent="-180975">
-                <a:lnSpc>
-                  <a:spcPct val="130000"/>
-                </a:lnSpc>
-                <a:buFont typeface="Wingdings" panose="05000000000000000000" pitchFamily="2" charset="2"/>
-                <a:buChar char="§"/>
-              </a:pPr>
               <a:r>
-                <a:rPr lang="ko-KR" altLang="en-US" sz="1400" spc="-150" dirty="0">
+                <a:rPr lang="ko-KR" altLang="en-US" sz="4800" spc="-150" dirty="0">
                   <a:solidFill>
                     <a:schemeClr val="bg1"/>
                   </a:solidFill>
-                  <a:latin typeface="Noto Sans CJK KR Thin" panose="020B0200000000000000" pitchFamily="34" charset="-127"/>
-                  <a:ea typeface="Noto Sans CJK KR Thin" panose="020B0200000000000000" pitchFamily="34" charset="-127"/>
-                  <a:cs typeface="Arial" panose="020B0604020202020204" pitchFamily="34" charset="0"/>
                 </a:rPr>
-                <a:t>설립배경</a:t>
-              </a:r>
-              <a:endParaRPr lang="en-US" altLang="ko-KR" sz="1400" spc="-150" dirty="0">
-                <a:solidFill>
-                  <a:schemeClr val="bg1"/>
-                </a:solidFill>
-                <a:latin typeface="Noto Sans CJK KR Thin" panose="020B0200000000000000" pitchFamily="34" charset="-127"/>
-                <a:ea typeface="Noto Sans CJK KR Thin" panose="020B0200000000000000" pitchFamily="34" charset="-127"/>
-                <a:cs typeface="Arial" panose="020B0604020202020204" pitchFamily="34" charset="0"/>
-              </a:endParaRPr>
-            </a:p>
-            <a:p>
-              <a:pPr marL="180975" indent="-180975">
-                <a:lnSpc>
-                  <a:spcPct val="130000"/>
-                </a:lnSpc>
-                <a:buFont typeface="Wingdings" panose="05000000000000000000" pitchFamily="2" charset="2"/>
-                <a:buChar char="§"/>
-              </a:pPr>
-              <a:r>
-                <a:rPr lang="ko-KR" altLang="en-US" sz="1400" spc="-150" dirty="0">
-                  <a:solidFill>
-                    <a:schemeClr val="bg1"/>
-                  </a:solidFill>
-                  <a:latin typeface="Noto Sans CJK KR Thin" panose="020B0200000000000000" pitchFamily="34" charset="-127"/>
-                  <a:ea typeface="Noto Sans CJK KR Thin" panose="020B0200000000000000" pitchFamily="34" charset="-127"/>
-                  <a:cs typeface="Arial" panose="020B0604020202020204" pitchFamily="34" charset="0"/>
-                </a:rPr>
-                <a:t>회사 비전   및   가치</a:t>
+                <a:t>구상도</a:t>
               </a:r>
             </a:p>
           </p:txBody>
         </p:sp>
         <p:sp>
           <p:nvSpPr>
-            <p:cNvPr id="10" name="TextBox 9"/>
+            <p:cNvPr id="22" name="TextBox 21"/>
             <p:cNvSpPr txBox="1"/>
             <p:nvPr/>
           </p:nvSpPr>
           <p:spPr>
             <a:xfrm>
-              <a:off x="4828086" y="3599353"/>
-              <a:ext cx="3541394" cy="652486"/>
+              <a:off x="2795719" y="2551537"/>
+              <a:ext cx="5436104" cy="830997"/>
             </a:xfrm>
             <a:prstGeom prst="rect">
               <a:avLst/>
@@ -5604,444 +5906,37 @@
             <a:noFill/>
           </p:spPr>
           <p:txBody>
-            <a:bodyPr wrap="square" rtlCol="0">
+            <a:bodyPr wrap="none" rtlCol="0">
               <a:spAutoFit/>
             </a:bodyPr>
             <a:lstStyle/>
             <a:p>
-              <a:pPr marL="180975" indent="-180975">
-                <a:lnSpc>
-                  <a:spcPct val="130000"/>
-                </a:lnSpc>
-                <a:buFont typeface="Wingdings" panose="05000000000000000000" pitchFamily="2" charset="2"/>
-                <a:buChar char="§"/>
-              </a:pPr>
               <a:r>
-                <a:rPr lang="en-US" altLang="ko-KR" sz="1400" spc="-150" dirty="0">
+                <a:rPr lang="en-US" altLang="ko-KR" sz="4800" spc="-150" dirty="0">
                   <a:solidFill>
                     <a:schemeClr val="bg1"/>
                   </a:solidFill>
-                  <a:latin typeface="Noto Sans CJK KR Thin" panose="020B0200000000000000" pitchFamily="34" charset="-127"/>
-                  <a:ea typeface="Noto Sans CJK KR Thin" panose="020B0200000000000000" pitchFamily="34" charset="-127"/>
-                  <a:cs typeface="Arial" panose="020B0604020202020204" pitchFamily="34" charset="0"/>
                 </a:rPr>
-                <a:t>SWOT </a:t>
+                <a:t>VS CODE  REVIEW</a:t>
               </a:r>
-              <a:r>
-                <a:rPr lang="ko-KR" altLang="en-US" sz="1400" spc="-150" dirty="0">
-                  <a:solidFill>
-                    <a:schemeClr val="bg1"/>
-                  </a:solidFill>
-                  <a:latin typeface="Noto Sans CJK KR Thin" panose="020B0200000000000000" pitchFamily="34" charset="-127"/>
-                  <a:ea typeface="Noto Sans CJK KR Thin" panose="020B0200000000000000" pitchFamily="34" charset="-127"/>
-                  <a:cs typeface="Arial" panose="020B0604020202020204" pitchFamily="34" charset="0"/>
-                </a:rPr>
-                <a:t>분석</a:t>
-              </a:r>
-              <a:endParaRPr lang="en-US" altLang="ko-KR" sz="1400" spc="-150" dirty="0">
+              <a:endParaRPr lang="ko-KR" altLang="en-US" sz="4800" spc="-150" dirty="0">
                 <a:solidFill>
                   <a:schemeClr val="bg1"/>
                 </a:solidFill>
-                <a:latin typeface="Noto Sans CJK KR Thin" panose="020B0200000000000000" pitchFamily="34" charset="-127"/>
-                <a:ea typeface="Noto Sans CJK KR Thin" panose="020B0200000000000000" pitchFamily="34" charset="-127"/>
-                <a:cs typeface="Arial" panose="020B0604020202020204" pitchFamily="34" charset="0"/>
               </a:endParaRPr>
-            </a:p>
-            <a:p>
-              <a:pPr marL="180975" indent="-180975">
-                <a:lnSpc>
-                  <a:spcPct val="130000"/>
-                </a:lnSpc>
-                <a:buFont typeface="Wingdings" panose="05000000000000000000" pitchFamily="2" charset="2"/>
-                <a:buChar char="§"/>
-              </a:pPr>
-              <a:r>
-                <a:rPr lang="en-US" altLang="ko-KR" sz="1400" spc="-150" dirty="0">
-                  <a:solidFill>
-                    <a:schemeClr val="bg1"/>
-                  </a:solidFill>
-                  <a:latin typeface="Noto Sans CJK KR Thin" panose="020B0200000000000000" pitchFamily="34" charset="-127"/>
-                  <a:ea typeface="Noto Sans CJK KR Thin" panose="020B0200000000000000" pitchFamily="34" charset="-127"/>
-                  <a:cs typeface="Arial" panose="020B0604020202020204" pitchFamily="34" charset="0"/>
-                </a:rPr>
-                <a:t>STP </a:t>
-              </a:r>
-              <a:r>
-                <a:rPr lang="ko-KR" altLang="en-US" sz="1400" spc="-150" dirty="0">
-                  <a:solidFill>
-                    <a:schemeClr val="bg1"/>
-                  </a:solidFill>
-                  <a:latin typeface="Noto Sans CJK KR Thin" panose="020B0200000000000000" pitchFamily="34" charset="-127"/>
-                  <a:ea typeface="Noto Sans CJK KR Thin" panose="020B0200000000000000" pitchFamily="34" charset="-127"/>
-                  <a:cs typeface="Arial" panose="020B0604020202020204" pitchFamily="34" charset="0"/>
-                </a:rPr>
-                <a:t>전략</a:t>
-              </a:r>
             </a:p>
           </p:txBody>
         </p:sp>
-        <p:grpSp>
-          <p:nvGrpSpPr>
-            <p:cNvPr id="11" name="그룹 10"/>
-            <p:cNvGrpSpPr/>
-            <p:nvPr/>
-          </p:nvGrpSpPr>
-          <p:grpSpPr>
-            <a:xfrm>
-              <a:off x="212651" y="3206557"/>
-              <a:ext cx="1499449" cy="369332"/>
-              <a:chOff x="212651" y="3255887"/>
-              <a:chExt cx="1499449" cy="369332"/>
-            </a:xfrm>
-          </p:grpSpPr>
-          <p:sp>
-            <p:nvSpPr>
-              <p:cNvPr id="23" name="TextBox 22"/>
-              <p:cNvSpPr txBox="1"/>
-              <p:nvPr/>
-            </p:nvSpPr>
-            <p:spPr>
-              <a:xfrm>
-                <a:off x="212651" y="3255887"/>
-                <a:ext cx="545342" cy="369332"/>
-              </a:xfrm>
-              <a:prstGeom prst="rect">
-                <a:avLst/>
-              </a:prstGeom>
-              <a:noFill/>
-            </p:spPr>
-            <p:txBody>
-              <a:bodyPr wrap="none" rtlCol="0">
-                <a:spAutoFit/>
-              </a:bodyPr>
-              <a:lstStyle/>
-              <a:p>
-                <a:r>
-                  <a:rPr lang="en-US" altLang="ko-KR" dirty="0">
-                    <a:solidFill>
-                      <a:schemeClr val="bg1"/>
-                    </a:solidFill>
-                  </a:rPr>
-                  <a:t>001</a:t>
-                </a:r>
-                <a:endParaRPr lang="ko-KR" altLang="en-US" dirty="0">
-                  <a:solidFill>
-                    <a:schemeClr val="bg1"/>
-                  </a:solidFill>
-                </a:endParaRPr>
-              </a:p>
-            </p:txBody>
-          </p:sp>
-          <p:sp>
-            <p:nvSpPr>
-              <p:cNvPr id="24" name="TextBox 23"/>
-              <p:cNvSpPr txBox="1"/>
-              <p:nvPr/>
-            </p:nvSpPr>
-            <p:spPr>
-              <a:xfrm>
-                <a:off x="757993" y="3255887"/>
-                <a:ext cx="954107" cy="369332"/>
-              </a:xfrm>
-              <a:prstGeom prst="rect">
-                <a:avLst/>
-              </a:prstGeom>
-              <a:noFill/>
-            </p:spPr>
-            <p:txBody>
-              <a:bodyPr wrap="none" rtlCol="0">
-                <a:spAutoFit/>
-              </a:bodyPr>
-              <a:lstStyle/>
-              <a:p>
-                <a:r>
-                  <a:rPr lang="ko-KR" altLang="en-US" spc="-150" dirty="0">
-                    <a:solidFill>
-                      <a:schemeClr val="bg1"/>
-                    </a:solidFill>
-                  </a:rPr>
-                  <a:t>회사소개</a:t>
-                </a:r>
-              </a:p>
-            </p:txBody>
-          </p:sp>
-        </p:grpSp>
-        <p:grpSp>
-          <p:nvGrpSpPr>
-            <p:cNvPr id="12" name="그룹 11"/>
-            <p:cNvGrpSpPr/>
-            <p:nvPr/>
-          </p:nvGrpSpPr>
-          <p:grpSpPr>
-            <a:xfrm>
-              <a:off x="2356877" y="3206557"/>
-              <a:ext cx="1499449" cy="369332"/>
-              <a:chOff x="2356877" y="3206557"/>
-              <a:chExt cx="1499449" cy="369332"/>
-            </a:xfrm>
-          </p:grpSpPr>
-          <p:sp>
-            <p:nvSpPr>
-              <p:cNvPr id="21" name="TextBox 20"/>
-              <p:cNvSpPr txBox="1"/>
-              <p:nvPr/>
-            </p:nvSpPr>
-            <p:spPr>
-              <a:xfrm>
-                <a:off x="2356877" y="3206557"/>
-                <a:ext cx="603050" cy="369332"/>
-              </a:xfrm>
-              <a:prstGeom prst="rect">
-                <a:avLst/>
-              </a:prstGeom>
-              <a:noFill/>
-            </p:spPr>
-            <p:txBody>
-              <a:bodyPr wrap="none" rtlCol="0">
-                <a:spAutoFit/>
-              </a:bodyPr>
-              <a:lstStyle/>
-              <a:p>
-                <a:r>
-                  <a:rPr lang="en-US" altLang="ko-KR" dirty="0">
-                    <a:solidFill>
-                      <a:schemeClr val="bg1"/>
-                    </a:solidFill>
-                  </a:rPr>
-                  <a:t>002</a:t>
-                </a:r>
-                <a:endParaRPr lang="ko-KR" altLang="en-US" dirty="0">
-                  <a:solidFill>
-                    <a:schemeClr val="bg1"/>
-                  </a:solidFill>
-                </a:endParaRPr>
-              </a:p>
-            </p:txBody>
-          </p:sp>
-          <p:sp>
-            <p:nvSpPr>
-              <p:cNvPr id="22" name="TextBox 21"/>
-              <p:cNvSpPr txBox="1"/>
-              <p:nvPr/>
-            </p:nvSpPr>
-            <p:spPr>
-              <a:xfrm>
-                <a:off x="2902219" y="3206557"/>
-                <a:ext cx="954107" cy="369332"/>
-              </a:xfrm>
-              <a:prstGeom prst="rect">
-                <a:avLst/>
-              </a:prstGeom>
-              <a:noFill/>
-            </p:spPr>
-            <p:txBody>
-              <a:bodyPr wrap="none" rtlCol="0">
-                <a:spAutoFit/>
-              </a:bodyPr>
-              <a:lstStyle/>
-              <a:p>
-                <a:r>
-                  <a:rPr lang="ko-KR" altLang="en-US" spc="-150" dirty="0">
-                    <a:solidFill>
-                      <a:schemeClr val="bg1"/>
-                    </a:solidFill>
-                  </a:rPr>
-                  <a:t>시장현황</a:t>
-                </a:r>
-              </a:p>
-            </p:txBody>
-          </p:sp>
-        </p:grpSp>
-        <p:grpSp>
-          <p:nvGrpSpPr>
-            <p:cNvPr id="13" name="그룹 12"/>
-            <p:cNvGrpSpPr/>
-            <p:nvPr/>
-          </p:nvGrpSpPr>
-          <p:grpSpPr>
-            <a:xfrm>
-              <a:off x="4510531" y="3206557"/>
-              <a:ext cx="1683795" cy="369332"/>
-              <a:chOff x="4952427" y="3207822"/>
-              <a:chExt cx="1683795" cy="369332"/>
-            </a:xfrm>
-          </p:grpSpPr>
-          <p:sp>
-            <p:nvSpPr>
-              <p:cNvPr id="19" name="TextBox 18"/>
-              <p:cNvSpPr txBox="1"/>
-              <p:nvPr/>
-            </p:nvSpPr>
-            <p:spPr>
-              <a:xfrm>
-                <a:off x="4952427" y="3207822"/>
-                <a:ext cx="595035" cy="369332"/>
-              </a:xfrm>
-              <a:prstGeom prst="rect">
-                <a:avLst/>
-              </a:prstGeom>
-              <a:noFill/>
-            </p:spPr>
-            <p:txBody>
-              <a:bodyPr wrap="none" rtlCol="0">
-                <a:spAutoFit/>
-              </a:bodyPr>
-              <a:lstStyle/>
-              <a:p>
-                <a:r>
-                  <a:rPr lang="en-US" altLang="ko-KR" dirty="0">
-                    <a:solidFill>
-                      <a:schemeClr val="bg1"/>
-                    </a:solidFill>
-                  </a:rPr>
-                  <a:t>003</a:t>
-                </a:r>
-                <a:endParaRPr lang="ko-KR" altLang="en-US" dirty="0">
-                  <a:solidFill>
-                    <a:schemeClr val="bg1"/>
-                  </a:solidFill>
-                </a:endParaRPr>
-              </a:p>
-            </p:txBody>
-          </p:sp>
-          <p:sp>
-            <p:nvSpPr>
-              <p:cNvPr id="20" name="TextBox 19"/>
-              <p:cNvSpPr txBox="1"/>
-              <p:nvPr/>
-            </p:nvSpPr>
-            <p:spPr>
-              <a:xfrm>
-                <a:off x="5497769" y="3207822"/>
-                <a:ext cx="1138453" cy="369332"/>
-              </a:xfrm>
-              <a:prstGeom prst="rect">
-                <a:avLst/>
-              </a:prstGeom>
-              <a:noFill/>
-            </p:spPr>
-            <p:txBody>
-              <a:bodyPr wrap="none" rtlCol="0">
-                <a:spAutoFit/>
-              </a:bodyPr>
-              <a:lstStyle/>
-              <a:p>
-                <a:r>
-                  <a:rPr lang="en-US" altLang="ko-KR" spc="-150" dirty="0">
-                    <a:solidFill>
-                      <a:schemeClr val="bg1"/>
-                    </a:solidFill>
-                  </a:rPr>
-                  <a:t>SWOT</a:t>
-                </a:r>
-                <a:r>
-                  <a:rPr lang="ko-KR" altLang="en-US" spc="-150" dirty="0">
-                    <a:solidFill>
-                      <a:schemeClr val="bg1"/>
-                    </a:solidFill>
-                  </a:rPr>
-                  <a:t>분석</a:t>
-                </a:r>
-              </a:p>
-            </p:txBody>
-          </p:sp>
-        </p:grpSp>
-        <p:grpSp>
-          <p:nvGrpSpPr>
-            <p:cNvPr id="14" name="그룹 13"/>
-            <p:cNvGrpSpPr/>
-            <p:nvPr/>
-          </p:nvGrpSpPr>
-          <p:grpSpPr>
-            <a:xfrm>
-              <a:off x="6787282" y="3206557"/>
-              <a:ext cx="2773837" cy="369332"/>
-              <a:chOff x="6956206" y="3236652"/>
-              <a:chExt cx="2773837" cy="369332"/>
-            </a:xfrm>
-          </p:grpSpPr>
-          <p:sp>
-            <p:nvSpPr>
-              <p:cNvPr id="17" name="TextBox 16"/>
-              <p:cNvSpPr txBox="1"/>
-              <p:nvPr/>
-            </p:nvSpPr>
-            <p:spPr>
-              <a:xfrm>
-                <a:off x="6956206" y="3236652"/>
-                <a:ext cx="595035" cy="369332"/>
-              </a:xfrm>
-              <a:prstGeom prst="rect">
-                <a:avLst/>
-              </a:prstGeom>
-              <a:noFill/>
-            </p:spPr>
-            <p:txBody>
-              <a:bodyPr wrap="none" rtlCol="0">
-                <a:spAutoFit/>
-              </a:bodyPr>
-              <a:lstStyle/>
-              <a:p>
-                <a:r>
-                  <a:rPr lang="en-US" altLang="ko-KR" dirty="0">
-                    <a:solidFill>
-                      <a:schemeClr val="bg1"/>
-                    </a:solidFill>
-                  </a:rPr>
-                  <a:t>004</a:t>
-                </a:r>
-                <a:endParaRPr lang="ko-KR" altLang="en-US" dirty="0">
-                  <a:solidFill>
-                    <a:schemeClr val="bg1"/>
-                  </a:solidFill>
-                </a:endParaRPr>
-              </a:p>
-            </p:txBody>
-          </p:sp>
-          <p:sp>
-            <p:nvSpPr>
-              <p:cNvPr id="18" name="TextBox 17"/>
-              <p:cNvSpPr txBox="1"/>
-              <p:nvPr/>
-            </p:nvSpPr>
-            <p:spPr>
-              <a:xfrm>
-                <a:off x="7501548" y="3236652"/>
-                <a:ext cx="2228495" cy="369332"/>
-              </a:xfrm>
-              <a:prstGeom prst="rect">
-                <a:avLst/>
-              </a:prstGeom>
-              <a:noFill/>
-            </p:spPr>
-            <p:txBody>
-              <a:bodyPr wrap="none" rtlCol="0">
-                <a:spAutoFit/>
-              </a:bodyPr>
-              <a:lstStyle/>
-              <a:p>
-                <a:r>
-                  <a:rPr lang="ko-KR" altLang="en-US" spc="-150" dirty="0">
-                    <a:solidFill>
-                      <a:schemeClr val="bg1"/>
-                    </a:solidFill>
-                  </a:rPr>
-                  <a:t>신규전략 및 구체적 방안</a:t>
-                </a:r>
-              </a:p>
-            </p:txBody>
-          </p:sp>
-        </p:grpSp>
         <p:sp>
           <p:nvSpPr>
-            <p:cNvPr id="15" name="TextBox 14"/>
+            <p:cNvPr id="20" name="TextBox 19"/>
             <p:cNvSpPr txBox="1"/>
             <p:nvPr/>
           </p:nvSpPr>
           <p:spPr>
             <a:xfrm>
-              <a:off x="2730406" y="3590883"/>
-              <a:ext cx="3541394" cy="652486"/>
+              <a:off x="2795719" y="3785055"/>
+              <a:ext cx="4962320" cy="830997"/>
             </a:xfrm>
             <a:prstGeom prst="rect">
               <a:avLst/>
@@ -6049,81 +5944,69 @@
             <a:noFill/>
           </p:spPr>
           <p:txBody>
-            <a:bodyPr wrap="square" rtlCol="0">
+            <a:bodyPr wrap="none" rtlCol="0">
               <a:spAutoFit/>
             </a:bodyPr>
             <a:lstStyle/>
             <a:p>
-              <a:pPr marL="180975" indent="-180975">
-                <a:lnSpc>
-                  <a:spcPct val="130000"/>
-                </a:lnSpc>
-                <a:buFont typeface="Wingdings" panose="05000000000000000000" pitchFamily="2" charset="2"/>
-                <a:buChar char="§"/>
-              </a:pPr>
               <a:r>
-                <a:rPr lang="ko-KR" altLang="en-US" sz="1400" spc="-150" dirty="0">
+                <a:rPr lang="en-US" altLang="ko-KR" sz="4800" spc="-150" dirty="0">
                   <a:solidFill>
                     <a:schemeClr val="bg1"/>
                   </a:solidFill>
-                  <a:latin typeface="Noto Sans CJK KR Thin" panose="020B0200000000000000" pitchFamily="34" charset="-127"/>
-                  <a:ea typeface="Noto Sans CJK KR Thin" panose="020B0200000000000000" pitchFamily="34" charset="-127"/>
-                  <a:cs typeface="Arial" panose="020B0604020202020204" pitchFamily="34" charset="0"/>
                 </a:rPr>
-                <a:t>국내외 현황</a:t>
+                <a:t>Telegram</a:t>
               </a:r>
-              <a:endParaRPr lang="en-US" altLang="ko-KR" sz="1400" spc="-150" dirty="0">
+              <a:r>
+                <a:rPr lang="ko-KR" altLang="en-US" sz="4800" spc="-150" dirty="0">
+                  <a:solidFill>
+                    <a:schemeClr val="bg1"/>
+                  </a:solidFill>
+                </a:rPr>
+                <a:t> </a:t>
+              </a:r>
+              <a:r>
+                <a:rPr lang="en-US" altLang="ko-KR" sz="4800" spc="-150" dirty="0">
+                  <a:solidFill>
+                    <a:schemeClr val="bg1"/>
+                  </a:solidFill>
+                </a:rPr>
+                <a:t>Chat</a:t>
+              </a:r>
+              <a:r>
+                <a:rPr lang="ko-KR" altLang="en-US" sz="4800" spc="-150" dirty="0">
+                  <a:solidFill>
+                    <a:schemeClr val="bg1"/>
+                  </a:solidFill>
+                </a:rPr>
+                <a:t> </a:t>
+              </a:r>
+              <a:r>
+                <a:rPr lang="en-US" altLang="ko-KR" sz="4800" spc="-150" dirty="0">
+                  <a:solidFill>
+                    <a:schemeClr val="bg1"/>
+                  </a:solidFill>
+                </a:rPr>
+                <a:t>Bot</a:t>
+              </a:r>
+              <a:endParaRPr lang="ko-KR" altLang="en-US" sz="4800" spc="-150" dirty="0">
                 <a:solidFill>
                   <a:schemeClr val="bg1"/>
                 </a:solidFill>
-                <a:latin typeface="Noto Sans CJK KR Thin" panose="020B0200000000000000" pitchFamily="34" charset="-127"/>
-                <a:ea typeface="Noto Sans CJK KR Thin" panose="020B0200000000000000" pitchFamily="34" charset="-127"/>
-                <a:cs typeface="Arial" panose="020B0604020202020204" pitchFamily="34" charset="0"/>
               </a:endParaRPr>
-            </a:p>
-            <a:p>
-              <a:pPr marL="180975" indent="-180975">
-                <a:lnSpc>
-                  <a:spcPct val="130000"/>
-                </a:lnSpc>
-                <a:buFont typeface="Wingdings" panose="05000000000000000000" pitchFamily="2" charset="2"/>
-                <a:buChar char="§"/>
-              </a:pPr>
-              <a:r>
-                <a:rPr lang="ko-KR" altLang="en-US" sz="1400" spc="-150" dirty="0" err="1">
-                  <a:solidFill>
-                    <a:schemeClr val="bg1"/>
-                  </a:solidFill>
-                  <a:latin typeface="Noto Sans CJK KR Thin" panose="020B0200000000000000" pitchFamily="34" charset="-127"/>
-                  <a:ea typeface="Noto Sans CJK KR Thin" panose="020B0200000000000000" pitchFamily="34" charset="-127"/>
-                  <a:cs typeface="Arial" panose="020B0604020202020204" pitchFamily="34" charset="0"/>
-                </a:rPr>
-                <a:t>타겟</a:t>
-              </a:r>
-              <a:r>
-                <a:rPr lang="ko-KR" altLang="en-US" sz="1400" spc="-150" dirty="0">
-                  <a:solidFill>
-                    <a:schemeClr val="bg1"/>
-                  </a:solidFill>
-                  <a:latin typeface="Noto Sans CJK KR Thin" panose="020B0200000000000000" pitchFamily="34" charset="-127"/>
-                  <a:ea typeface="Noto Sans CJK KR Thin" panose="020B0200000000000000" pitchFamily="34" charset="-127"/>
-                  <a:cs typeface="Arial" panose="020B0604020202020204" pitchFamily="34" charset="0"/>
-                </a:rPr>
-                <a:t> 시장 분석</a:t>
-              </a:r>
             </a:p>
           </p:txBody>
         </p:sp>
         <p:sp>
           <p:nvSpPr>
-            <p:cNvPr id="16" name="TextBox 15"/>
+            <p:cNvPr id="18" name="TextBox 17"/>
             <p:cNvSpPr txBox="1"/>
             <p:nvPr/>
           </p:nvSpPr>
           <p:spPr>
             <a:xfrm>
-              <a:off x="7284800" y="3622817"/>
-              <a:ext cx="3541394" cy="652486"/>
+              <a:off x="2795719" y="4938793"/>
+              <a:ext cx="4549259" cy="830997"/>
             </a:xfrm>
             <a:prstGeom prst="rect">
               <a:avLst/>
@@ -6131,57 +6014,40 @@
             <a:noFill/>
           </p:spPr>
           <p:txBody>
-            <a:bodyPr wrap="square" rtlCol="0">
+            <a:bodyPr wrap="none" rtlCol="0">
               <a:spAutoFit/>
             </a:bodyPr>
             <a:lstStyle/>
             <a:p>
-              <a:pPr marL="180975" indent="-180975">
-                <a:lnSpc>
-                  <a:spcPct val="130000"/>
-                </a:lnSpc>
-                <a:buFont typeface="Wingdings" panose="05000000000000000000" pitchFamily="2" charset="2"/>
-                <a:buChar char="§"/>
-              </a:pPr>
               <a:r>
-                <a:rPr lang="ko-KR" altLang="en-US" sz="1400" spc="-150" dirty="0">
+                <a:rPr lang="en-US" altLang="ko-KR" sz="4800" spc="-150" dirty="0">
                   <a:solidFill>
                     <a:schemeClr val="bg1"/>
                   </a:solidFill>
-                  <a:latin typeface="Noto Sans CJK KR Thin" panose="020B0200000000000000" pitchFamily="34" charset="-127"/>
-                  <a:ea typeface="Noto Sans CJK KR Thin" panose="020B0200000000000000" pitchFamily="34" charset="-127"/>
-                  <a:cs typeface="Arial" panose="020B0604020202020204" pitchFamily="34" charset="0"/>
                 </a:rPr>
-                <a:t>신규 비즈니스 아이디어</a:t>
+                <a:t>Trouble</a:t>
               </a:r>
-              <a:endParaRPr lang="en-US" altLang="ko-KR" sz="1400" spc="-150" dirty="0">
+              <a:r>
+                <a:rPr lang="ko-KR" altLang="en-US" sz="4800" spc="-150" dirty="0">
+                  <a:solidFill>
+                    <a:schemeClr val="bg1"/>
+                  </a:solidFill>
+                </a:rPr>
+                <a:t> </a:t>
+              </a:r>
+              <a:r>
+                <a:rPr lang="en-US" altLang="ko-KR" sz="4800" spc="-150" dirty="0">
+                  <a:solidFill>
+                    <a:schemeClr val="bg1"/>
+                  </a:solidFill>
+                </a:rPr>
+                <a:t>Shooting</a:t>
+              </a:r>
+              <a:endParaRPr lang="ko-KR" altLang="en-US" sz="4800" spc="-150" dirty="0">
                 <a:solidFill>
                   <a:schemeClr val="bg1"/>
                 </a:solidFill>
-                <a:latin typeface="Noto Sans CJK KR Thin" panose="020B0200000000000000" pitchFamily="34" charset="-127"/>
-                <a:ea typeface="Noto Sans CJK KR Thin" panose="020B0200000000000000" pitchFamily="34" charset="-127"/>
-                <a:cs typeface="Arial" panose="020B0604020202020204" pitchFamily="34" charset="0"/>
               </a:endParaRPr>
-            </a:p>
-            <a:p>
-              <a:pPr marL="180975" indent="-180975">
-                <a:lnSpc>
-                  <a:spcPct val="130000"/>
-                </a:lnSpc>
-                <a:buFont typeface="Wingdings" panose="05000000000000000000" pitchFamily="2" charset="2"/>
-                <a:buChar char="§"/>
-              </a:pPr>
-              <a:r>
-                <a:rPr lang="ko-KR" altLang="en-US" sz="1400" spc="-150" dirty="0">
-                  <a:solidFill>
-                    <a:schemeClr val="bg1"/>
-                  </a:solidFill>
-                  <a:latin typeface="Noto Sans CJK KR Thin" panose="020B0200000000000000" pitchFamily="34" charset="-127"/>
-                  <a:ea typeface="Noto Sans CJK KR Thin" panose="020B0200000000000000" pitchFamily="34" charset="-127"/>
-                  <a:cs typeface="Arial" panose="020B0604020202020204" pitchFamily="34" charset="0"/>
-                </a:rPr>
-                <a:t>프로젝트 일정표</a:t>
-              </a:r>
             </a:p>
           </p:txBody>
         </p:sp>
@@ -6194,7 +6060,7 @@
         </p:nvCxnSpPr>
         <p:spPr>
           <a:xfrm>
-            <a:off x="338006" y="724659"/>
+            <a:off x="5630728" y="1161652"/>
             <a:ext cx="1374094" cy="0"/>
           </a:xfrm>
           <a:prstGeom prst="line">
@@ -6221,6 +6087,182 @@
           </a:fontRef>
         </p:style>
       </p:cxnSp>
+      <p:sp>
+        <p:nvSpPr>
+          <p:cNvPr id="2" name="TextBox 1">
+            <a:extLst>
+              <a:ext uri="{FF2B5EF4-FFF2-40B4-BE49-F238E27FC236}">
+                <a16:creationId xmlns:a16="http://schemas.microsoft.com/office/drawing/2014/main" id="{BAA86253-52DE-B4CD-1E6C-66D0EF0F7990}"/>
+              </a:ext>
+            </a:extLst>
+          </p:cNvPr>
+          <p:cNvSpPr txBox="1"/>
+          <p:nvPr/>
+        </p:nvSpPr>
+        <p:spPr>
+          <a:xfrm>
+            <a:off x="1352939" y="1474236"/>
+            <a:ext cx="1236906" cy="830997"/>
+          </a:xfrm>
+          <a:prstGeom prst="rect">
+            <a:avLst/>
+          </a:prstGeom>
+          <a:noFill/>
+        </p:spPr>
+        <p:txBody>
+          <a:bodyPr wrap="square" rtlCol="0">
+            <a:spAutoFit/>
+          </a:bodyPr>
+          <a:lstStyle/>
+          <a:p>
+            <a:r>
+              <a:rPr lang="en-US" altLang="ko-KR" sz="4800" dirty="0">
+                <a:solidFill>
+                  <a:schemeClr val="bg1"/>
+                </a:solidFill>
+              </a:rPr>
+              <a:t>1.</a:t>
+            </a:r>
+            <a:endParaRPr lang="ko-KR" altLang="en-US" sz="4800" dirty="0">
+              <a:solidFill>
+                <a:schemeClr val="bg1"/>
+              </a:solidFill>
+            </a:endParaRPr>
+          </a:p>
+        </p:txBody>
+      </p:sp>
+      <p:sp>
+        <p:nvSpPr>
+          <p:cNvPr id="5" name="TextBox 4">
+            <a:extLst>
+              <a:ext uri="{FF2B5EF4-FFF2-40B4-BE49-F238E27FC236}">
+                <a16:creationId xmlns:a16="http://schemas.microsoft.com/office/drawing/2014/main" id="{A7EAEA3F-5C7B-94ED-EEEE-9FF935E2C7F9}"/>
+              </a:ext>
+            </a:extLst>
+          </p:cNvPr>
+          <p:cNvSpPr txBox="1"/>
+          <p:nvPr/>
+        </p:nvSpPr>
+        <p:spPr>
+          <a:xfrm>
+            <a:off x="1352939" y="2635641"/>
+            <a:ext cx="1236906" cy="830997"/>
+          </a:xfrm>
+          <a:prstGeom prst="rect">
+            <a:avLst/>
+          </a:prstGeom>
+          <a:noFill/>
+        </p:spPr>
+        <p:txBody>
+          <a:bodyPr wrap="square" rtlCol="0">
+            <a:spAutoFit/>
+          </a:bodyPr>
+          <a:lstStyle/>
+          <a:p>
+            <a:r>
+              <a:rPr lang="en-US" altLang="ko-KR" sz="4800" dirty="0">
+                <a:solidFill>
+                  <a:schemeClr val="bg1"/>
+                </a:solidFill>
+              </a:rPr>
+              <a:t>2.</a:t>
+            </a:r>
+            <a:endParaRPr lang="ko-KR" altLang="en-US" sz="4800" dirty="0">
+              <a:solidFill>
+                <a:schemeClr val="bg1"/>
+              </a:solidFill>
+            </a:endParaRPr>
+          </a:p>
+        </p:txBody>
+      </p:sp>
+      <p:sp>
+        <p:nvSpPr>
+          <p:cNvPr id="6" name="TextBox 5">
+            <a:extLst>
+              <a:ext uri="{FF2B5EF4-FFF2-40B4-BE49-F238E27FC236}">
+                <a16:creationId xmlns:a16="http://schemas.microsoft.com/office/drawing/2014/main" id="{D0FF8365-563C-271E-BA8B-2BC880FAB62D}"/>
+              </a:ext>
+            </a:extLst>
+          </p:cNvPr>
+          <p:cNvSpPr txBox="1"/>
+          <p:nvPr/>
+        </p:nvSpPr>
+        <p:spPr>
+          <a:xfrm>
+            <a:off x="1352939" y="3856579"/>
+            <a:ext cx="1236906" cy="830997"/>
+          </a:xfrm>
+          <a:prstGeom prst="rect">
+            <a:avLst/>
+          </a:prstGeom>
+          <a:noFill/>
+        </p:spPr>
+        <p:txBody>
+          <a:bodyPr wrap="square" rtlCol="0">
+            <a:spAutoFit/>
+          </a:bodyPr>
+          <a:lstStyle/>
+          <a:p>
+            <a:r>
+              <a:rPr lang="en-US" altLang="ko-KR" sz="4800" dirty="0">
+                <a:solidFill>
+                  <a:schemeClr val="bg1"/>
+                </a:solidFill>
+              </a:rPr>
+              <a:t>3.</a:t>
+            </a:r>
+            <a:endParaRPr lang="ko-KR" altLang="en-US" sz="4800" dirty="0">
+              <a:solidFill>
+                <a:schemeClr val="bg1"/>
+              </a:solidFill>
+            </a:endParaRPr>
+          </a:p>
+        </p:txBody>
+      </p:sp>
+      <p:sp>
+        <p:nvSpPr>
+          <p:cNvPr id="25" name="TextBox 24">
+            <a:extLst>
+              <a:ext uri="{FF2B5EF4-FFF2-40B4-BE49-F238E27FC236}">
+                <a16:creationId xmlns:a16="http://schemas.microsoft.com/office/drawing/2014/main" id="{F565E271-3180-409B-9E8A-9E72647C0630}"/>
+              </a:ext>
+            </a:extLst>
+          </p:cNvPr>
+          <p:cNvSpPr txBox="1"/>
+          <p:nvPr/>
+        </p:nvSpPr>
+        <p:spPr>
+          <a:xfrm>
+            <a:off x="1352939" y="5044859"/>
+            <a:ext cx="1236906" cy="830997"/>
+          </a:xfrm>
+          <a:prstGeom prst="rect">
+            <a:avLst/>
+          </a:prstGeom>
+          <a:noFill/>
+        </p:spPr>
+        <p:txBody>
+          <a:bodyPr wrap="square" rtlCol="0">
+            <a:spAutoFit/>
+          </a:bodyPr>
+          <a:lstStyle/>
+          <a:p>
+            <a:r>
+              <a:rPr lang="en-US" altLang="ko-KR" sz="4800" dirty="0">
+                <a:solidFill>
+                  <a:schemeClr val="bg1"/>
+                </a:solidFill>
+              </a:rPr>
+              <a:t>4.</a:t>
+            </a:r>
+            <a:endParaRPr lang="ko-KR" altLang="en-US" sz="4800" dirty="0">
+              <a:solidFill>
+                <a:schemeClr val="bg1"/>
+              </a:solidFill>
+            </a:endParaRPr>
+          </a:p>
+        </p:txBody>
+      </p:sp>
     </p:spTree>
     <p:extLst>
       <p:ext uri="{BB962C8B-B14F-4D97-AF65-F5344CB8AC3E}">
@@ -7257,41 +7299,6 @@
       </p:sp>
       <p:cxnSp>
         <p:nvCxnSpPr>
-          <p:cNvPr id="24" name="직선 연결선 23"/>
-          <p:cNvCxnSpPr/>
-          <p:nvPr/>
-        </p:nvCxnSpPr>
-        <p:spPr>
-          <a:xfrm>
-            <a:off x="6096000" y="1722475"/>
-            <a:ext cx="0" cy="4019107"/>
-          </a:xfrm>
-          <a:prstGeom prst="line">
-            <a:avLst/>
-          </a:prstGeom>
-          <a:ln>
-            <a:solidFill>
-              <a:schemeClr val="accent6"/>
-            </a:solidFill>
-          </a:ln>
-        </p:spPr>
-        <p:style>
-          <a:lnRef idx="1">
-            <a:schemeClr val="accent1"/>
-          </a:lnRef>
-          <a:fillRef idx="0">
-            <a:schemeClr val="accent1"/>
-          </a:fillRef>
-          <a:effectRef idx="0">
-            <a:schemeClr val="accent1"/>
-          </a:effectRef>
-          <a:fontRef idx="minor">
-            <a:schemeClr val="tx1"/>
-          </a:fontRef>
-        </p:style>
-      </p:cxnSp>
-      <p:cxnSp>
-        <p:nvCxnSpPr>
           <p:cNvPr id="17" name="직선 연결선 16"/>
           <p:cNvCxnSpPr/>
           <p:nvPr/>
@@ -7408,7 +7415,7 @@
                   <a:schemeClr val="bg1"/>
                 </a:solidFill>
               </a:rPr>
-              <a:t>1</a:t>
+              <a:t>2</a:t>
             </a:r>
             <a:endParaRPr lang="ko-KR" altLang="en-US" sz="3200" b="1" dirty="0">
               <a:solidFill>
@@ -7427,7 +7434,7 @@
         <p:spPr>
           <a:xfrm>
             <a:off x="1188881" y="317304"/>
-            <a:ext cx="3592669" cy="707886"/>
+            <a:ext cx="5173819" cy="707886"/>
           </a:xfrm>
           <a:prstGeom prst="rect">
             <a:avLst/>
@@ -7441,108 +7448,194 @@
           <a:lstStyle/>
           <a:p>
             <a:r>
-              <a:rPr lang="ko-KR" altLang="en-US" sz="4000" dirty="0">
+              <a:rPr lang="en-US" altLang="ko-KR" sz="4000" dirty="0" err="1">
                 <a:latin typeface="HY견고딕" panose="02030600000101010101" pitchFamily="18" charset="-127"/>
                 <a:ea typeface="HY견고딕" panose="02030600000101010101" pitchFamily="18" charset="-127"/>
               </a:rPr>
-              <a:t>사용한 </a:t>
-            </a:r>
-            <a:r>
-              <a:rPr lang="en-US" altLang="ko-KR" sz="4000" dirty="0">
+              <a:t>TimerTrigger</a:t>
+            </a:r>
+            <a:endParaRPr lang="en-US" altLang="ko-KR" sz="4000" dirty="0">
+              <a:latin typeface="HY견고딕" panose="02030600000101010101" pitchFamily="18" charset="-127"/>
+              <a:ea typeface="HY견고딕" panose="02030600000101010101" pitchFamily="18" charset="-127"/>
+            </a:endParaRPr>
+          </a:p>
+        </p:txBody>
+      </p:sp>
+      <p:sp>
+        <p:nvSpPr>
+          <p:cNvPr id="7" name="TextBox 6"/>
+          <p:cNvSpPr txBox="1"/>
+          <p:nvPr/>
+        </p:nvSpPr>
+        <p:spPr>
+          <a:xfrm>
+            <a:off x="6676442" y="1589078"/>
+            <a:ext cx="4429125" cy="3539430"/>
+          </a:xfrm>
+          <a:prstGeom prst="rect">
+            <a:avLst/>
+          </a:prstGeom>
+          <a:noFill/>
+        </p:spPr>
+        <p:txBody>
+          <a:bodyPr wrap="square" rtlCol="0">
+            <a:spAutoFit/>
+          </a:bodyPr>
+          <a:lstStyle/>
+          <a:p>
+            <a:r>
+              <a:rPr lang="en-US" altLang="ko-KR" sz="3200" dirty="0">
                 <a:latin typeface="HY견고딕" panose="02030600000101010101" pitchFamily="18" charset="-127"/>
                 <a:ea typeface="HY견고딕" panose="02030600000101010101" pitchFamily="18" charset="-127"/>
               </a:rPr>
-              <a:t>API </a:t>
-            </a:r>
+              <a:t>Timer Trigger</a:t>
+            </a:r>
+          </a:p>
+          <a:p>
+            <a:r>
+              <a:rPr lang="en-US" altLang="ko-KR" sz="3200" dirty="0">
+                <a:latin typeface="HY견고딕" panose="02030600000101010101" pitchFamily="18" charset="-127"/>
+                <a:ea typeface="HY견고딕" panose="02030600000101010101" pitchFamily="18" charset="-127"/>
+              </a:rPr>
+              <a:t>:</a:t>
+            </a:r>
+            <a:r>
+              <a:rPr lang="ko-KR" altLang="en-US" sz="3200" dirty="0">
+                <a:latin typeface="HY견고딕" panose="02030600000101010101" pitchFamily="18" charset="-127"/>
+                <a:ea typeface="HY견고딕" panose="02030600000101010101" pitchFamily="18" charset="-127"/>
+              </a:rPr>
+              <a:t>매 </a:t>
+            </a:r>
+            <a:r>
+              <a:rPr lang="en-US" altLang="ko-KR" sz="3200" dirty="0">
+                <a:latin typeface="HY견고딕" panose="02030600000101010101" pitchFamily="18" charset="-127"/>
+                <a:ea typeface="HY견고딕" panose="02030600000101010101" pitchFamily="18" charset="-127"/>
+              </a:rPr>
+              <a:t>1</a:t>
+            </a:r>
+            <a:r>
+              <a:rPr lang="ko-KR" altLang="en-US" sz="3200" dirty="0">
+                <a:latin typeface="HY견고딕" panose="02030600000101010101" pitchFamily="18" charset="-127"/>
+                <a:ea typeface="HY견고딕" panose="02030600000101010101" pitchFamily="18" charset="-127"/>
+              </a:rPr>
+              <a:t>분마다 </a:t>
+            </a:r>
+            <a:endParaRPr lang="en-US" altLang="ko-KR" sz="3200" dirty="0">
+              <a:latin typeface="HY견고딕" panose="02030600000101010101" pitchFamily="18" charset="-127"/>
+              <a:ea typeface="HY견고딕" panose="02030600000101010101" pitchFamily="18" charset="-127"/>
+            </a:endParaRPr>
+          </a:p>
+          <a:p>
+            <a:endParaRPr lang="en-US" altLang="ko-KR" sz="3200" dirty="0">
+              <a:latin typeface="HY견고딕" panose="02030600000101010101" pitchFamily="18" charset="-127"/>
+              <a:ea typeface="HY견고딕" panose="02030600000101010101" pitchFamily="18" charset="-127"/>
+            </a:endParaRPr>
+          </a:p>
+          <a:p>
+            <a:r>
+              <a:rPr lang="ko-KR" altLang="en-US" sz="3200" dirty="0">
+                <a:latin typeface="HY견고딕" panose="02030600000101010101" pitchFamily="18" charset="-127"/>
+                <a:ea typeface="HY견고딕" panose="02030600000101010101" pitchFamily="18" charset="-127"/>
+              </a:rPr>
+              <a:t>이유 </a:t>
+            </a:r>
+            <a:r>
+              <a:rPr lang="en-US" altLang="ko-KR" sz="3200" dirty="0">
+                <a:latin typeface="HY견고딕" panose="02030600000101010101" pitchFamily="18" charset="-127"/>
+                <a:ea typeface="HY견고딕" panose="02030600000101010101" pitchFamily="18" charset="-127"/>
+              </a:rPr>
+              <a:t>: </a:t>
+            </a:r>
+            <a:r>
+              <a:rPr lang="en-US" altLang="ko-KR" sz="3200" dirty="0" err="1">
+                <a:latin typeface="HY견고딕" panose="02030600000101010101" pitchFamily="18" charset="-127"/>
+                <a:ea typeface="HY견고딕" panose="02030600000101010101" pitchFamily="18" charset="-127"/>
+              </a:rPr>
+              <a:t>api</a:t>
+            </a:r>
+            <a:r>
+              <a:rPr lang="en-US" altLang="ko-KR" sz="3200" dirty="0">
+                <a:latin typeface="HY견고딕" panose="02030600000101010101" pitchFamily="18" charset="-127"/>
+                <a:ea typeface="HY견고딕" panose="02030600000101010101" pitchFamily="18" charset="-127"/>
+              </a:rPr>
+              <a:t> </a:t>
+            </a:r>
+            <a:r>
+              <a:rPr lang="ko-KR" altLang="en-US" sz="3200" dirty="0">
+                <a:latin typeface="HY견고딕" panose="02030600000101010101" pitchFamily="18" charset="-127"/>
+                <a:ea typeface="HY견고딕" panose="02030600000101010101" pitchFamily="18" charset="-127"/>
+              </a:rPr>
+              <a:t>갱신 데이터가 초단위로 나타나지 않아 </a:t>
+            </a:r>
+            <a:r>
+              <a:rPr lang="en-US" altLang="ko-KR" sz="3200" dirty="0">
+                <a:latin typeface="HY견고딕" panose="02030600000101010101" pitchFamily="18" charset="-127"/>
+                <a:ea typeface="HY견고딕" panose="02030600000101010101" pitchFamily="18" charset="-127"/>
+              </a:rPr>
+              <a:t>1</a:t>
+            </a:r>
+            <a:r>
+              <a:rPr lang="ko-KR" altLang="en-US" sz="3200" dirty="0">
+                <a:latin typeface="HY견고딕" panose="02030600000101010101" pitchFamily="18" charset="-127"/>
+                <a:ea typeface="HY견고딕" panose="02030600000101010101" pitchFamily="18" charset="-127"/>
+              </a:rPr>
+              <a:t>분간격으로 해도 정확도가 괜찮습니다</a:t>
+            </a:r>
+            <a:r>
+              <a:rPr lang="en-US" altLang="ko-KR" sz="3200" dirty="0">
+                <a:latin typeface="HY견고딕" panose="02030600000101010101" pitchFamily="18" charset="-127"/>
+                <a:ea typeface="HY견고딕" panose="02030600000101010101" pitchFamily="18" charset="-127"/>
+              </a:rPr>
+              <a:t>.</a:t>
+            </a:r>
+            <a:r>
+              <a:rPr lang="ko-KR" altLang="en-US" sz="3200" dirty="0">
+                <a:latin typeface="HY견고딕" panose="02030600000101010101" pitchFamily="18" charset="-127"/>
+                <a:ea typeface="HY견고딕" panose="02030600000101010101" pitchFamily="18" charset="-127"/>
+              </a:rPr>
+              <a:t> </a:t>
+            </a:r>
+            <a:endParaRPr lang="en-US" altLang="ko-KR" sz="3200" dirty="0">
+              <a:latin typeface="HY견고딕" panose="02030600000101010101" pitchFamily="18" charset="-127"/>
+              <a:ea typeface="HY견고딕" panose="02030600000101010101" pitchFamily="18" charset="-127"/>
+            </a:endParaRPr>
           </a:p>
         </p:txBody>
       </p:sp>
       <p:pic>
         <p:nvPicPr>
-          <p:cNvPr id="4098" name="Picture 2" descr="https://cdn.discordapp.com/attachments/424058557609148418/1051526545619034132/image.png"/>
+          <p:cNvPr id="3" name="그림 2">
+            <a:extLst>
+              <a:ext uri="{FF2B5EF4-FFF2-40B4-BE49-F238E27FC236}">
+                <a16:creationId xmlns:a16="http://schemas.microsoft.com/office/drawing/2014/main" id="{FD92DB62-3338-7D0C-B99D-77BA84FB40FE}"/>
+              </a:ext>
+            </a:extLst>
+          </p:cNvPr>
           <p:cNvPicPr>
-            <a:picLocks noChangeAspect="1" noChangeArrowheads="1"/>
+            <a:picLocks noChangeAspect="1"/>
           </p:cNvPicPr>
           <p:nvPr/>
         </p:nvPicPr>
         <p:blipFill>
-          <a:blip r:embed="rId2">
-            <a:extLst>
-              <a:ext uri="{28A0092B-C50C-407E-A947-70E740481C1C}">
-                <a14:useLocalDpi xmlns:a14="http://schemas.microsoft.com/office/drawing/2010/main" val="0"/>
-              </a:ext>
-            </a:extLst>
-          </a:blip>
-          <a:srcRect/>
+          <a:blip r:embed="rId2"/>
           <a:stretch>
             <a:fillRect/>
           </a:stretch>
         </p:blipFill>
-        <p:spPr bwMode="auto">
-          <a:xfrm>
-            <a:off x="6281682" y="1722475"/>
-            <a:ext cx="5910318" cy="4287800"/>
-          </a:xfrm>
-          <a:prstGeom prst="rect">
-            <a:avLst/>
-          </a:prstGeom>
-          <a:noFill/>
-          <a:extLst>
-            <a:ext uri="{909E8E84-426E-40DD-AFC4-6F175D3DCCD1}">
-              <a14:hiddenFill xmlns:a14="http://schemas.microsoft.com/office/drawing/2010/main">
-                <a:solidFill>
-                  <a:srgbClr val="FFFFFF"/>
-                </a:solidFill>
-              </a14:hiddenFill>
-            </a:ext>
-          </a:extLst>
-        </p:spPr>
-      </p:pic>
-      <p:pic>
-        <p:nvPicPr>
-          <p:cNvPr id="4100" name="Picture 4" descr="https://cdn.discordapp.com/attachments/424058557609148418/1051525771266625586/image.png"/>
-          <p:cNvPicPr>
-            <a:picLocks noChangeAspect="1" noChangeArrowheads="1"/>
-          </p:cNvPicPr>
-          <p:nvPr/>
-        </p:nvPicPr>
-        <p:blipFill>
-          <a:blip r:embed="rId3">
-            <a:extLst>
-              <a:ext uri="{28A0092B-C50C-407E-A947-70E740481C1C}">
-                <a14:useLocalDpi xmlns:a14="http://schemas.microsoft.com/office/drawing/2010/main" val="0"/>
-              </a:ext>
-            </a:extLst>
-          </a:blip>
-          <a:srcRect/>
-          <a:stretch>
-            <a:fillRect/>
-          </a:stretch>
-        </p:blipFill>
-        <p:spPr bwMode="auto">
-          <a:xfrm>
-            <a:off x="265814" y="1722475"/>
-            <a:ext cx="5538457" cy="4287800"/>
-          </a:xfrm>
-          <a:prstGeom prst="rect">
-            <a:avLst/>
-          </a:prstGeom>
-          <a:noFill/>
-          <a:extLst>
-            <a:ext uri="{909E8E84-426E-40DD-AFC4-6F175D3DCCD1}">
-              <a14:hiddenFill xmlns:a14="http://schemas.microsoft.com/office/drawing/2010/main">
-                <a:solidFill>
-                  <a:srgbClr val="FFFFFF"/>
-                </a:solidFill>
-              </a14:hiddenFill>
-            </a:ext>
-          </a:extLst>
+        <p:spPr>
+          <a:xfrm>
+            <a:off x="490138" y="1589078"/>
+            <a:ext cx="5173819" cy="4198984"/>
+          </a:xfrm>
+          <a:prstGeom prst="rect">
+            <a:avLst/>
+          </a:prstGeom>
         </p:spPr>
       </p:pic>
     </p:spTree>
     <p:extLst>
       <p:ext uri="{BB962C8B-B14F-4D97-AF65-F5344CB8AC3E}">
-        <p14:creationId xmlns:p14="http://schemas.microsoft.com/office/powerpoint/2010/main" val="1754339492"/>
+        <p14:creationId xmlns:p14="http://schemas.microsoft.com/office/powerpoint/2010/main" val="3542538250"/>
       </p:ext>
     </p:extLst>
   </p:cSld>
@@ -7612,6 +7705,41 @@
       </p:sp>
       <p:cxnSp>
         <p:nvCxnSpPr>
+          <p:cNvPr id="24" name="직선 연결선 23"/>
+          <p:cNvCxnSpPr/>
+          <p:nvPr/>
+        </p:nvCxnSpPr>
+        <p:spPr>
+          <a:xfrm>
+            <a:off x="6096000" y="1722475"/>
+            <a:ext cx="0" cy="4019107"/>
+          </a:xfrm>
+          <a:prstGeom prst="line">
+            <a:avLst/>
+          </a:prstGeom>
+          <a:ln>
+            <a:solidFill>
+              <a:schemeClr val="accent6"/>
+            </a:solidFill>
+          </a:ln>
+        </p:spPr>
+        <p:style>
+          <a:lnRef idx="1">
+            <a:schemeClr val="accent1"/>
+          </a:lnRef>
+          <a:fillRef idx="0">
+            <a:schemeClr val="accent1"/>
+          </a:fillRef>
+          <a:effectRef idx="0">
+            <a:schemeClr val="accent1"/>
+          </a:effectRef>
+          <a:fontRef idx="minor">
+            <a:schemeClr val="tx1"/>
+          </a:fontRef>
+        </p:style>
+      </p:cxnSp>
+      <p:cxnSp>
+        <p:nvCxnSpPr>
           <p:cNvPr id="17" name="직선 연결선 16"/>
           <p:cNvCxnSpPr/>
           <p:nvPr/>
@@ -7747,7 +7875,7 @@
         <p:spPr>
           <a:xfrm>
             <a:off x="1188881" y="317304"/>
-            <a:ext cx="5173819" cy="707886"/>
+            <a:ext cx="3592669" cy="707886"/>
           </a:xfrm>
           <a:prstGeom prst="rect">
             <a:avLst/>
@@ -7761,29 +7889,25 @@
           <a:lstStyle/>
           <a:p>
             <a:r>
+              <a:rPr lang="ko-KR" altLang="en-US" sz="4000" dirty="0">
+                <a:latin typeface="HY견고딕" panose="02030600000101010101" pitchFamily="18" charset="-127"/>
+                <a:ea typeface="HY견고딕" panose="02030600000101010101" pitchFamily="18" charset="-127"/>
+              </a:rPr>
+              <a:t>사용한 </a:t>
+            </a:r>
+            <a:r>
               <a:rPr lang="en-US" altLang="ko-KR" sz="4000" dirty="0">
                 <a:latin typeface="HY견고딕" panose="02030600000101010101" pitchFamily="18" charset="-127"/>
                 <a:ea typeface="HY견고딕" panose="02030600000101010101" pitchFamily="18" charset="-127"/>
               </a:rPr>
-              <a:t>API &gt;&gt; JSON </a:t>
-            </a:r>
-            <a:r>
-              <a:rPr lang="ko-KR" altLang="en-US" sz="4000" dirty="0">
-                <a:latin typeface="HY견고딕" panose="02030600000101010101" pitchFamily="18" charset="-127"/>
-                <a:ea typeface="HY견고딕" panose="02030600000101010101" pitchFamily="18" charset="-127"/>
-              </a:rPr>
-              <a:t>코드 </a:t>
-            </a:r>
-            <a:endParaRPr lang="en-US" altLang="ko-KR" sz="4000" dirty="0">
-              <a:latin typeface="HY견고딕" panose="02030600000101010101" pitchFamily="18" charset="-127"/>
-              <a:ea typeface="HY견고딕" panose="02030600000101010101" pitchFamily="18" charset="-127"/>
-            </a:endParaRPr>
+              <a:t>API </a:t>
+            </a:r>
           </a:p>
         </p:txBody>
       </p:sp>
       <p:pic>
         <p:nvPicPr>
-          <p:cNvPr id="5122" name="Picture 2" descr="https://cdn.discordapp.com/attachments/424058557609148418/1051525302280519790/image.png"/>
+          <p:cNvPr id="4098" name="Picture 2" descr="https://cdn.discordapp.com/attachments/424058557609148418/1051526545619034132/image.png"/>
           <p:cNvPicPr>
             <a:picLocks noChangeAspect="1" noChangeArrowheads="1"/>
           </p:cNvPicPr>
@@ -7804,8 +7928,8 @@
         </p:blipFill>
         <p:spPr bwMode="auto">
           <a:xfrm>
-            <a:off x="749440" y="1472185"/>
-            <a:ext cx="10855781" cy="2807208"/>
+            <a:off x="6281682" y="1722475"/>
+            <a:ext cx="5910318" cy="4287800"/>
           </a:xfrm>
           <a:prstGeom prst="rect">
             <a:avLst/>
@@ -7822,43 +7946,51 @@
           </a:extLst>
         </p:spPr>
       </p:pic>
-      <p:sp>
-        <p:nvSpPr>
-          <p:cNvPr id="12" name="TextBox 11"/>
-          <p:cNvSpPr txBox="1"/>
-          <p:nvPr/>
-        </p:nvSpPr>
-        <p:spPr>
-          <a:xfrm>
-            <a:off x="6177330" y="501970"/>
-            <a:ext cx="3374664" cy="523220"/>
+      <p:pic>
+        <p:nvPicPr>
+          <p:cNvPr id="4100" name="Picture 4" descr="https://cdn.discordapp.com/attachments/424058557609148418/1051525771266625586/image.png"/>
+          <p:cNvPicPr>
+            <a:picLocks noChangeAspect="1" noChangeArrowheads="1"/>
+          </p:cNvPicPr>
+          <p:nvPr/>
+        </p:nvPicPr>
+        <p:blipFill>
+          <a:blip r:embed="rId3">
+            <a:extLst>
+              <a:ext uri="{28A0092B-C50C-407E-A947-70E740481C1C}">
+                <a14:useLocalDpi xmlns:a14="http://schemas.microsoft.com/office/drawing/2010/main" val="0"/>
+              </a:ext>
+            </a:extLst>
+          </a:blip>
+          <a:srcRect/>
+          <a:stretch>
+            <a:fillRect/>
+          </a:stretch>
+        </p:blipFill>
+        <p:spPr bwMode="auto">
+          <a:xfrm>
+            <a:off x="265814" y="1722475"/>
+            <a:ext cx="5538457" cy="4287800"/>
           </a:xfrm>
           <a:prstGeom prst="rect">
             <a:avLst/>
           </a:prstGeom>
           <a:noFill/>
-        </p:spPr>
-        <p:txBody>
-          <a:bodyPr wrap="square" rtlCol="0">
-            <a:spAutoFit/>
-          </a:bodyPr>
-          <a:lstStyle/>
-          <a:p>
-            <a:pPr fontAlgn="base"/>
-            <a:r>
-              <a:rPr lang="en-US" altLang="ko-KR" sz="2800" dirty="0">
-                <a:latin typeface="HY견고딕" panose="02030600000101010101" pitchFamily="18" charset="-127"/>
-                <a:ea typeface="HY견고딕" panose="02030600000101010101" pitchFamily="18" charset="-127"/>
-              </a:rPr>
-              <a:t>bus_data_file.py</a:t>
-            </a:r>
-          </a:p>
-        </p:txBody>
-      </p:sp>
+          <a:extLst>
+            <a:ext uri="{909E8E84-426E-40DD-AFC4-6F175D3DCCD1}">
+              <a14:hiddenFill xmlns:a14="http://schemas.microsoft.com/office/drawing/2010/main">
+                <a:solidFill>
+                  <a:srgbClr val="FFFFFF"/>
+                </a:solidFill>
+              </a14:hiddenFill>
+            </a:ext>
+          </a:extLst>
+        </p:spPr>
+      </p:pic>
     </p:spTree>
     <p:extLst>
       <p:ext uri="{BB962C8B-B14F-4D97-AF65-F5344CB8AC3E}">
-        <p14:creationId xmlns:p14="http://schemas.microsoft.com/office/powerpoint/2010/main" val="2096202610"/>
+        <p14:creationId xmlns:p14="http://schemas.microsoft.com/office/powerpoint/2010/main" val="1754339492"/>
       </p:ext>
     </p:extLst>
   </p:cSld>
@@ -8056,14 +8188,14 @@
       </p:sp>
       <p:sp>
         <p:nvSpPr>
-          <p:cNvPr id="11" name="TextBox 10"/>
+          <p:cNvPr id="10" name="TextBox 9"/>
           <p:cNvSpPr txBox="1"/>
           <p:nvPr/>
         </p:nvSpPr>
         <p:spPr>
           <a:xfrm>
             <a:off x="1188881" y="317304"/>
-            <a:ext cx="5049994" cy="707886"/>
+            <a:ext cx="5173819" cy="707886"/>
           </a:xfrm>
           <a:prstGeom prst="rect">
             <a:avLst/>
@@ -8081,104 +8213,25 @@
                 <a:latin typeface="HY견고딕" panose="02030600000101010101" pitchFamily="18" charset="-127"/>
                 <a:ea typeface="HY견고딕" panose="02030600000101010101" pitchFamily="18" charset="-127"/>
               </a:rPr>
-              <a:t>JSON </a:t>
+              <a:t>API &gt;&gt; JSON </a:t>
             </a:r>
             <a:r>
               <a:rPr lang="ko-KR" altLang="en-US" sz="4000" dirty="0">
                 <a:latin typeface="HY견고딕" panose="02030600000101010101" pitchFamily="18" charset="-127"/>
                 <a:ea typeface="HY견고딕" panose="02030600000101010101" pitchFamily="18" charset="-127"/>
               </a:rPr>
-              <a:t>변환</a:t>
-            </a:r>
-            <a:r>
-              <a:rPr lang="en-US" altLang="ko-KR" sz="4000" dirty="0">
-                <a:latin typeface="HY견고딕" panose="02030600000101010101" pitchFamily="18" charset="-127"/>
-                <a:ea typeface="HY견고딕" panose="02030600000101010101" pitchFamily="18" charset="-127"/>
-              </a:rPr>
-              <a:t> </a:t>
-            </a:r>
-          </a:p>
-        </p:txBody>
-      </p:sp>
-      <p:sp>
-        <p:nvSpPr>
-          <p:cNvPr id="12" name="TextBox 11"/>
-          <p:cNvSpPr txBox="1"/>
-          <p:nvPr/>
-        </p:nvSpPr>
-        <p:spPr>
-          <a:xfrm>
-            <a:off x="6617341" y="2604520"/>
-            <a:ext cx="4107809" cy="1569660"/>
-          </a:xfrm>
-          <a:prstGeom prst="rect">
-            <a:avLst/>
-          </a:prstGeom>
-          <a:noFill/>
-        </p:spPr>
-        <p:txBody>
-          <a:bodyPr wrap="square" rtlCol="0">
-            <a:spAutoFit/>
-          </a:bodyPr>
-          <a:lstStyle/>
-          <a:p>
-            <a:r>
-              <a:rPr lang="en-US" altLang="ko-KR" sz="3200" dirty="0">
-                <a:latin typeface="HY견고딕" panose="02030600000101010101" pitchFamily="18" charset="-127"/>
-                <a:ea typeface="HY견고딕" panose="02030600000101010101" pitchFamily="18" charset="-127"/>
-              </a:rPr>
-              <a:t>JSON</a:t>
-            </a:r>
-            <a:r>
-              <a:rPr lang="ko-KR" altLang="en-US" sz="3200" dirty="0">
-                <a:latin typeface="HY견고딕" panose="02030600000101010101" pitchFamily="18" charset="-127"/>
-                <a:ea typeface="HY견고딕" panose="02030600000101010101" pitchFamily="18" charset="-127"/>
-              </a:rPr>
-              <a:t> 데이터를 </a:t>
-            </a:r>
-            <a:endParaRPr lang="en-US" altLang="ko-KR" sz="3200" dirty="0">
+              <a:t>코드 </a:t>
+            </a:r>
+            <a:endParaRPr lang="en-US" altLang="ko-KR" sz="4000" dirty="0">
               <a:latin typeface="HY견고딕" panose="02030600000101010101" pitchFamily="18" charset="-127"/>
               <a:ea typeface="HY견고딕" panose="02030600000101010101" pitchFamily="18" charset="-127"/>
             </a:endParaRPr>
           </a:p>
-          <a:p>
-            <a:r>
-              <a:rPr lang="en-US" altLang="ko-KR" sz="3200" dirty="0">
-                <a:latin typeface="HY견고딕" panose="02030600000101010101" pitchFamily="18" charset="-127"/>
-                <a:ea typeface="HY견고딕" panose="02030600000101010101" pitchFamily="18" charset="-127"/>
-              </a:rPr>
-              <a:t>Append </a:t>
-            </a:r>
-            <a:r>
-              <a:rPr lang="ko-KR" altLang="en-US" sz="3200" dirty="0">
-                <a:latin typeface="HY견고딕" panose="02030600000101010101" pitchFamily="18" charset="-127"/>
-                <a:ea typeface="HY견고딕" panose="02030600000101010101" pitchFamily="18" charset="-127"/>
-              </a:rPr>
-              <a:t>하기 위해 </a:t>
-            </a:r>
-            <a:endParaRPr lang="en-US" altLang="ko-KR" sz="3200" dirty="0">
-              <a:latin typeface="HY견고딕" panose="02030600000101010101" pitchFamily="18" charset="-127"/>
-              <a:ea typeface="HY견고딕" panose="02030600000101010101" pitchFamily="18" charset="-127"/>
-            </a:endParaRPr>
-          </a:p>
-          <a:p>
-            <a:r>
-              <a:rPr lang="ko-KR" altLang="en-US" sz="3200" dirty="0">
-                <a:latin typeface="HY견고딕" panose="02030600000101010101" pitchFamily="18" charset="-127"/>
-                <a:ea typeface="HY견고딕" panose="02030600000101010101" pitchFamily="18" charset="-127"/>
-              </a:rPr>
-              <a:t>분할 시킨 코드 </a:t>
-            </a:r>
-            <a:endParaRPr lang="en-US" altLang="ko-KR" sz="3200" dirty="0">
-              <a:latin typeface="HY견고딕" panose="02030600000101010101" pitchFamily="18" charset="-127"/>
-              <a:ea typeface="HY견고딕" panose="02030600000101010101" pitchFamily="18" charset="-127"/>
-            </a:endParaRPr>
-          </a:p>
         </p:txBody>
       </p:sp>
       <p:pic>
         <p:nvPicPr>
-          <p:cNvPr id="3078" name="Picture 6" descr="https://cdn.discordapp.com/attachments/424058557609148418/1051528886313295903/image.png"/>
+          <p:cNvPr id="5122" name="Picture 2" descr="https://cdn.discordapp.com/attachments/424058557609148418/1051525302280519790/image.png"/>
           <p:cNvPicPr>
             <a:picLocks noChangeAspect="1" noChangeArrowheads="1"/>
           </p:cNvPicPr>
@@ -8199,8 +8252,8 @@
         </p:blipFill>
         <p:spPr bwMode="auto">
           <a:xfrm>
-            <a:off x="749440" y="1350720"/>
-            <a:ext cx="5219700" cy="4772025"/>
+            <a:off x="749440" y="1854740"/>
+            <a:ext cx="10855781" cy="2807208"/>
           </a:xfrm>
           <a:prstGeom prst="rect">
             <a:avLst/>
@@ -8219,13 +8272,13 @@
       </p:pic>
       <p:sp>
         <p:nvSpPr>
-          <p:cNvPr id="13" name="TextBox 12"/>
+          <p:cNvPr id="12" name="TextBox 11"/>
           <p:cNvSpPr txBox="1"/>
           <p:nvPr/>
         </p:nvSpPr>
         <p:spPr>
           <a:xfrm>
-            <a:off x="4195623" y="527275"/>
+            <a:off x="6177330" y="501970"/>
             <a:ext cx="3374664" cy="523220"/>
           </a:xfrm>
           <a:prstGeom prst="rect">
@@ -8253,7 +8306,7 @@
     </p:spTree>
     <p:extLst>
       <p:ext uri="{BB962C8B-B14F-4D97-AF65-F5344CB8AC3E}">
-        <p14:creationId xmlns:p14="http://schemas.microsoft.com/office/powerpoint/2010/main" val="1768735390"/>
+        <p14:creationId xmlns:p14="http://schemas.microsoft.com/office/powerpoint/2010/main" val="2096202610"/>
       </p:ext>
     </p:extLst>
   </p:cSld>
@@ -8323,41 +8376,6 @@
       </p:sp>
       <p:cxnSp>
         <p:nvCxnSpPr>
-          <p:cNvPr id="24" name="직선 연결선 23"/>
-          <p:cNvCxnSpPr/>
-          <p:nvPr/>
-        </p:nvCxnSpPr>
-        <p:spPr>
-          <a:xfrm>
-            <a:off x="6096000" y="1722475"/>
-            <a:ext cx="0" cy="4019107"/>
-          </a:xfrm>
-          <a:prstGeom prst="line">
-            <a:avLst/>
-          </a:prstGeom>
-          <a:ln>
-            <a:solidFill>
-              <a:schemeClr val="accent6"/>
-            </a:solidFill>
-          </a:ln>
-        </p:spPr>
-        <p:style>
-          <a:lnRef idx="1">
-            <a:schemeClr val="accent1"/>
-          </a:lnRef>
-          <a:fillRef idx="0">
-            <a:schemeClr val="accent1"/>
-          </a:fillRef>
-          <a:effectRef idx="0">
-            <a:schemeClr val="accent1"/>
-          </a:effectRef>
-          <a:fontRef idx="minor">
-            <a:schemeClr val="tx1"/>
-          </a:fontRef>
-        </p:style>
-      </p:cxnSp>
-      <p:cxnSp>
-        <p:nvCxnSpPr>
           <p:cNvPr id="17" name="직선 연결선 16"/>
           <p:cNvCxnSpPr/>
           <p:nvPr/>
@@ -8486,14 +8504,14 @@
       </p:sp>
       <p:sp>
         <p:nvSpPr>
-          <p:cNvPr id="10" name="TextBox 9"/>
+          <p:cNvPr id="11" name="TextBox 10"/>
           <p:cNvSpPr txBox="1"/>
           <p:nvPr/>
         </p:nvSpPr>
         <p:spPr>
           <a:xfrm>
             <a:off x="1188881" y="317304"/>
-            <a:ext cx="3240244" cy="707886"/>
+            <a:ext cx="5049994" cy="707886"/>
           </a:xfrm>
           <a:prstGeom prst="rect">
             <a:avLst/>
@@ -8530,9 +8548,85 @@
           </a:p>
         </p:txBody>
       </p:sp>
+      <p:sp>
+        <p:nvSpPr>
+          <p:cNvPr id="12" name="TextBox 11"/>
+          <p:cNvSpPr txBox="1"/>
+          <p:nvPr/>
+        </p:nvSpPr>
+        <p:spPr>
+          <a:xfrm>
+            <a:off x="6617341" y="2604520"/>
+            <a:ext cx="4107809" cy="1569660"/>
+          </a:xfrm>
+          <a:prstGeom prst="rect">
+            <a:avLst/>
+          </a:prstGeom>
+          <a:noFill/>
+        </p:spPr>
+        <p:txBody>
+          <a:bodyPr wrap="square" rtlCol="0">
+            <a:spAutoFit/>
+          </a:bodyPr>
+          <a:lstStyle/>
+          <a:p>
+            <a:r>
+              <a:rPr lang="en-US" altLang="ko-KR" sz="3200" dirty="0">
+                <a:latin typeface="HY견고딕" panose="02030600000101010101" pitchFamily="18" charset="-127"/>
+                <a:ea typeface="HY견고딕" panose="02030600000101010101" pitchFamily="18" charset="-127"/>
+              </a:rPr>
+              <a:t>JSON</a:t>
+            </a:r>
+            <a:r>
+              <a:rPr lang="ko-KR" altLang="en-US" sz="3200" dirty="0">
+                <a:latin typeface="HY견고딕" panose="02030600000101010101" pitchFamily="18" charset="-127"/>
+                <a:ea typeface="HY견고딕" panose="02030600000101010101" pitchFamily="18" charset="-127"/>
+              </a:rPr>
+              <a:t> 데이터를 </a:t>
+            </a:r>
+            <a:endParaRPr lang="en-US" altLang="ko-KR" sz="3200" dirty="0">
+              <a:latin typeface="HY견고딕" panose="02030600000101010101" pitchFamily="18" charset="-127"/>
+              <a:ea typeface="HY견고딕" panose="02030600000101010101" pitchFamily="18" charset="-127"/>
+            </a:endParaRPr>
+          </a:p>
+          <a:p>
+            <a:r>
+              <a:rPr lang="en-US" altLang="ko-KR" sz="3200" dirty="0">
+                <a:latin typeface="HY견고딕" panose="02030600000101010101" pitchFamily="18" charset="-127"/>
+                <a:ea typeface="HY견고딕" panose="02030600000101010101" pitchFamily="18" charset="-127"/>
+              </a:rPr>
+              <a:t>Append </a:t>
+            </a:r>
+            <a:r>
+              <a:rPr lang="ko-KR" altLang="en-US" sz="3200" dirty="0">
+                <a:latin typeface="HY견고딕" panose="02030600000101010101" pitchFamily="18" charset="-127"/>
+                <a:ea typeface="HY견고딕" panose="02030600000101010101" pitchFamily="18" charset="-127"/>
+              </a:rPr>
+              <a:t>하기 위해 </a:t>
+            </a:r>
+            <a:endParaRPr lang="en-US" altLang="ko-KR" sz="3200" dirty="0">
+              <a:latin typeface="HY견고딕" panose="02030600000101010101" pitchFamily="18" charset="-127"/>
+              <a:ea typeface="HY견고딕" panose="02030600000101010101" pitchFamily="18" charset="-127"/>
+            </a:endParaRPr>
+          </a:p>
+          <a:p>
+            <a:r>
+              <a:rPr lang="ko-KR" altLang="en-US" sz="3200" dirty="0">
+                <a:latin typeface="HY견고딕" panose="02030600000101010101" pitchFamily="18" charset="-127"/>
+                <a:ea typeface="HY견고딕" panose="02030600000101010101" pitchFamily="18" charset="-127"/>
+              </a:rPr>
+              <a:t>분할 시킨 코드 </a:t>
+            </a:r>
+            <a:endParaRPr lang="en-US" altLang="ko-KR" sz="3200" dirty="0">
+              <a:latin typeface="HY견고딕" panose="02030600000101010101" pitchFamily="18" charset="-127"/>
+              <a:ea typeface="HY견고딕" panose="02030600000101010101" pitchFamily="18" charset="-127"/>
+            </a:endParaRPr>
+          </a:p>
+        </p:txBody>
+      </p:sp>
       <p:pic>
         <p:nvPicPr>
-          <p:cNvPr id="8" name="Picture 4" descr="https://cdn.discordapp.com/attachments/424058557609148418/1051527552478478406/image.png"/>
+          <p:cNvPr id="3078" name="Picture 6" descr="https://cdn.discordapp.com/attachments/424058557609148418/1051528886313295903/image.png"/>
           <p:cNvPicPr>
             <a:picLocks noChangeAspect="1" noChangeArrowheads="1"/>
           </p:cNvPicPr>
@@ -8553,8 +8647,8 @@
         </p:blipFill>
         <p:spPr bwMode="auto">
           <a:xfrm>
-            <a:off x="490138" y="1401460"/>
-            <a:ext cx="8676041" cy="4474105"/>
+            <a:off x="749440" y="1350720"/>
+            <a:ext cx="5219700" cy="4772025"/>
           </a:xfrm>
           <a:prstGeom prst="rect">
             <a:avLst/>
@@ -8573,23 +8667,19 @@
       </p:pic>
       <p:sp>
         <p:nvSpPr>
-          <p:cNvPr id="9" name="TextBox 8"/>
+          <p:cNvPr id="13" name="TextBox 12"/>
           <p:cNvSpPr txBox="1"/>
           <p:nvPr/>
         </p:nvSpPr>
         <p:spPr>
           <a:xfrm>
-            <a:off x="7486650" y="1336145"/>
-            <a:ext cx="4514850" cy="4031873"/>
-          </a:xfrm>
-          <a:prstGeom prst="rect">
-            <a:avLst/>
-          </a:prstGeom>
-          <a:solidFill>
-            <a:schemeClr val="bg1">
-              <a:lumMod val="95000"/>
-            </a:schemeClr>
-          </a:solidFill>
+            <a:off x="4195623" y="527275"/>
+            <a:ext cx="3374664" cy="523220"/>
+          </a:xfrm>
+          <a:prstGeom prst="rect">
+            <a:avLst/>
+          </a:prstGeom>
+          <a:noFill/>
         </p:spPr>
         <p:txBody>
           <a:bodyPr wrap="square" rtlCol="0">
@@ -8597,161 +8687,6 @@
           </a:bodyPr>
           <a:lstStyle/>
           <a:p>
-            <a:r>
-              <a:rPr lang="ko-KR" altLang="en-US" sz="3200" dirty="0">
-                <a:latin typeface="HY견고딕" panose="02030600000101010101" pitchFamily="18" charset="-127"/>
-                <a:ea typeface="HY견고딕" panose="02030600000101010101" pitchFamily="18" charset="-127"/>
-              </a:rPr>
-              <a:t>타입에 따른 다른 값을 </a:t>
-            </a:r>
-            <a:endParaRPr lang="en-US" altLang="ko-KR" sz="3200" dirty="0">
-              <a:latin typeface="HY견고딕" panose="02030600000101010101" pitchFamily="18" charset="-127"/>
-              <a:ea typeface="HY견고딕" panose="02030600000101010101" pitchFamily="18" charset="-127"/>
-            </a:endParaRPr>
-          </a:p>
-          <a:p>
-            <a:r>
-              <a:rPr lang="ko-KR" altLang="en-US" sz="3200" dirty="0">
-                <a:latin typeface="HY견고딕" panose="02030600000101010101" pitchFamily="18" charset="-127"/>
-                <a:ea typeface="HY견고딕" panose="02030600000101010101" pitchFamily="18" charset="-127"/>
-              </a:rPr>
-              <a:t>반환 하기 위한 </a:t>
-            </a:r>
-            <a:r>
-              <a:rPr lang="en-US" altLang="ko-KR" sz="3200" dirty="0">
-                <a:latin typeface="HY견고딕" panose="02030600000101010101" pitchFamily="18" charset="-127"/>
-                <a:ea typeface="HY견고딕" panose="02030600000101010101" pitchFamily="18" charset="-127"/>
-              </a:rPr>
-              <a:t>Key </a:t>
-            </a:r>
-            <a:r>
-              <a:rPr lang="ko-KR" altLang="en-US" sz="3200" dirty="0">
-                <a:latin typeface="HY견고딕" panose="02030600000101010101" pitchFamily="18" charset="-127"/>
-                <a:ea typeface="HY견고딕" panose="02030600000101010101" pitchFamily="18" charset="-127"/>
-              </a:rPr>
-              <a:t>값</a:t>
-            </a:r>
-            <a:endParaRPr lang="en-US" altLang="ko-KR" sz="3200" dirty="0">
-              <a:latin typeface="HY견고딕" panose="02030600000101010101" pitchFamily="18" charset="-127"/>
-              <a:ea typeface="HY견고딕" panose="02030600000101010101" pitchFamily="18" charset="-127"/>
-            </a:endParaRPr>
-          </a:p>
-          <a:p>
-            <a:endParaRPr lang="en-US" altLang="ko-KR" sz="3200" dirty="0">
-              <a:latin typeface="HY견고딕" panose="02030600000101010101" pitchFamily="18" charset="-127"/>
-              <a:ea typeface="HY견고딕" panose="02030600000101010101" pitchFamily="18" charset="-127"/>
-            </a:endParaRPr>
-          </a:p>
-          <a:p>
-            <a:r>
-              <a:rPr lang="en-US" altLang="ko-KR" sz="3200" dirty="0">
-                <a:latin typeface="HY견고딕" panose="02030600000101010101" pitchFamily="18" charset="-127"/>
-                <a:ea typeface="HY견고딕" panose="02030600000101010101" pitchFamily="18" charset="-127"/>
-              </a:rPr>
-              <a:t>0</a:t>
-            </a:r>
-            <a:r>
-              <a:rPr lang="ko-KR" altLang="en-US" sz="3200" dirty="0">
-                <a:latin typeface="HY견고딕" panose="02030600000101010101" pitchFamily="18" charset="-127"/>
-                <a:ea typeface="HY견고딕" panose="02030600000101010101" pitchFamily="18" charset="-127"/>
-              </a:rPr>
-              <a:t>은 </a:t>
-            </a:r>
-            <a:r>
-              <a:rPr lang="en-US" altLang="ko-KR" sz="3200" dirty="0">
-                <a:latin typeface="HY견고딕" panose="02030600000101010101" pitchFamily="18" charset="-127"/>
-                <a:ea typeface="HY견고딕" panose="02030600000101010101" pitchFamily="18" charset="-127"/>
-              </a:rPr>
-              <a:t>Azure</a:t>
-            </a:r>
-            <a:r>
-              <a:rPr lang="ko-KR" altLang="en-US" sz="3200" dirty="0">
-                <a:latin typeface="HY견고딕" panose="02030600000101010101" pitchFamily="18" charset="-127"/>
-                <a:ea typeface="HY견고딕" panose="02030600000101010101" pitchFamily="18" charset="-127"/>
-              </a:rPr>
-              <a:t>용</a:t>
-            </a:r>
-            <a:endParaRPr lang="en-US" altLang="ko-KR" sz="3200" dirty="0">
-              <a:latin typeface="HY견고딕" panose="02030600000101010101" pitchFamily="18" charset="-127"/>
-              <a:ea typeface="HY견고딕" panose="02030600000101010101" pitchFamily="18" charset="-127"/>
-            </a:endParaRPr>
-          </a:p>
-          <a:p>
-            <a:endParaRPr lang="en-US" altLang="ko-KR" sz="3200" dirty="0">
-              <a:latin typeface="HY견고딕" panose="02030600000101010101" pitchFamily="18" charset="-127"/>
-              <a:ea typeface="HY견고딕" panose="02030600000101010101" pitchFamily="18" charset="-127"/>
-            </a:endParaRPr>
-          </a:p>
-          <a:p>
-            <a:r>
-              <a:rPr lang="en-US" altLang="ko-KR" sz="3200" dirty="0">
-                <a:latin typeface="HY견고딕" panose="02030600000101010101" pitchFamily="18" charset="-127"/>
-                <a:ea typeface="HY견고딕" panose="02030600000101010101" pitchFamily="18" charset="-127"/>
-              </a:rPr>
-              <a:t>1</a:t>
-            </a:r>
-            <a:r>
-              <a:rPr lang="ko-KR" altLang="en-US" sz="3200" dirty="0">
-                <a:latin typeface="HY견고딕" panose="02030600000101010101" pitchFamily="18" charset="-127"/>
-                <a:ea typeface="HY견고딕" panose="02030600000101010101" pitchFamily="18" charset="-127"/>
-              </a:rPr>
-              <a:t>은</a:t>
-            </a:r>
-            <a:r>
-              <a:rPr lang="en-US" altLang="ko-KR" sz="3200" dirty="0">
-                <a:latin typeface="HY견고딕" panose="02030600000101010101" pitchFamily="18" charset="-127"/>
-                <a:ea typeface="HY견고딕" panose="02030600000101010101" pitchFamily="18" charset="-127"/>
-              </a:rPr>
-              <a:t> Python</a:t>
-            </a:r>
-            <a:r>
-              <a:rPr lang="ko-KR" altLang="en-US" sz="3200" dirty="0">
-                <a:latin typeface="HY견고딕" panose="02030600000101010101" pitchFamily="18" charset="-127"/>
-                <a:ea typeface="HY견고딕" panose="02030600000101010101" pitchFamily="18" charset="-127"/>
-              </a:rPr>
-              <a:t>용</a:t>
-            </a:r>
-            <a:endParaRPr lang="en-US" altLang="ko-KR" sz="3200" dirty="0">
-              <a:latin typeface="HY견고딕" panose="02030600000101010101" pitchFamily="18" charset="-127"/>
-              <a:ea typeface="HY견고딕" panose="02030600000101010101" pitchFamily="18" charset="-127"/>
-            </a:endParaRPr>
-          </a:p>
-          <a:p>
-            <a:endParaRPr lang="en-US" altLang="ko-KR" sz="3200" dirty="0">
-              <a:latin typeface="HY견고딕" panose="02030600000101010101" pitchFamily="18" charset="-127"/>
-              <a:ea typeface="HY견고딕" panose="02030600000101010101" pitchFamily="18" charset="-127"/>
-            </a:endParaRPr>
-          </a:p>
-          <a:p>
-            <a:endParaRPr lang="en-US" altLang="ko-KR" sz="3200" dirty="0">
-              <a:latin typeface="HY견고딕" panose="02030600000101010101" pitchFamily="18" charset="-127"/>
-              <a:ea typeface="HY견고딕" panose="02030600000101010101" pitchFamily="18" charset="-127"/>
-            </a:endParaRPr>
-          </a:p>
-        </p:txBody>
-      </p:sp>
-      <p:sp>
-        <p:nvSpPr>
-          <p:cNvPr id="11" name="TextBox 10"/>
-          <p:cNvSpPr txBox="1"/>
-          <p:nvPr/>
-        </p:nvSpPr>
-        <p:spPr>
-          <a:xfrm>
-            <a:off x="4632192" y="501970"/>
-            <a:ext cx="3374664" cy="523220"/>
-          </a:xfrm>
-          <a:prstGeom prst="rect">
-            <a:avLst/>
-          </a:prstGeom>
-          <a:noFill/>
-        </p:spPr>
-        <p:txBody>
-          <a:bodyPr wrap="square" rtlCol="0">
-            <a:spAutoFit/>
-          </a:bodyPr>
-          <a:lstStyle/>
-          <a:p>
             <a:pPr fontAlgn="base"/>
             <a:r>
               <a:rPr lang="en-US" altLang="ko-KR" sz="2800" dirty="0">
@@ -8766,7 +8701,7 @@
     </p:spTree>
     <p:extLst>
       <p:ext uri="{BB962C8B-B14F-4D97-AF65-F5344CB8AC3E}">
-        <p14:creationId xmlns:p14="http://schemas.microsoft.com/office/powerpoint/2010/main" val="598115194"/>
+        <p14:creationId xmlns:p14="http://schemas.microsoft.com/office/powerpoint/2010/main" val="1768735390"/>
       </p:ext>
     </p:extLst>
   </p:cSld>
@@ -8836,6 +8771,41 @@
       </p:sp>
       <p:cxnSp>
         <p:nvCxnSpPr>
+          <p:cNvPr id="24" name="직선 연결선 23"/>
+          <p:cNvCxnSpPr/>
+          <p:nvPr/>
+        </p:nvCxnSpPr>
+        <p:spPr>
+          <a:xfrm>
+            <a:off x="6096000" y="1722475"/>
+            <a:ext cx="0" cy="4019107"/>
+          </a:xfrm>
+          <a:prstGeom prst="line">
+            <a:avLst/>
+          </a:prstGeom>
+          <a:ln>
+            <a:solidFill>
+              <a:schemeClr val="accent6"/>
+            </a:solidFill>
+          </a:ln>
+        </p:spPr>
+        <p:style>
+          <a:lnRef idx="1">
+            <a:schemeClr val="accent1"/>
+          </a:lnRef>
+          <a:fillRef idx="0">
+            <a:schemeClr val="accent1"/>
+          </a:fillRef>
+          <a:effectRef idx="0">
+            <a:schemeClr val="accent1"/>
+          </a:effectRef>
+          <a:fontRef idx="minor">
+            <a:schemeClr val="tx1"/>
+          </a:fontRef>
+        </p:style>
+      </p:cxnSp>
+      <p:cxnSp>
+        <p:nvCxnSpPr>
           <p:cNvPr id="17" name="직선 연결선 16"/>
           <p:cNvCxnSpPr/>
           <p:nvPr/>
@@ -8964,14 +8934,14 @@
       </p:sp>
       <p:sp>
         <p:nvSpPr>
-          <p:cNvPr id="8" name="TextBox 7"/>
+          <p:cNvPr id="10" name="TextBox 9"/>
           <p:cNvSpPr txBox="1"/>
           <p:nvPr/>
         </p:nvSpPr>
         <p:spPr>
           <a:xfrm>
-            <a:off x="6177330" y="501970"/>
-            <a:ext cx="3374664" cy="523220"/>
+            <a:off x="1188881" y="317304"/>
+            <a:ext cx="3240244" cy="707886"/>
           </a:xfrm>
           <a:prstGeom prst="rect">
             <a:avLst/>
@@ -8984,120 +8954,33 @@
           </a:bodyPr>
           <a:lstStyle/>
           <a:p>
-            <a:pPr fontAlgn="base"/>
-            <a:r>
-              <a:rPr lang="en-US" altLang="ko-KR" sz="2800" dirty="0">
-                <a:latin typeface="HY견고딕" panose="02030600000101010101" pitchFamily="18" charset="-127"/>
-                <a:ea typeface="HY견고딕" panose="02030600000101010101" pitchFamily="18" charset="-127"/>
-              </a:rPr>
-              <a:t>__init__.py</a:t>
-            </a:r>
-          </a:p>
-        </p:txBody>
-      </p:sp>
-      <p:sp>
-        <p:nvSpPr>
-          <p:cNvPr id="11" name="TextBox 10"/>
-          <p:cNvSpPr txBox="1"/>
-          <p:nvPr/>
-        </p:nvSpPr>
-        <p:spPr>
-          <a:xfrm>
-            <a:off x="1188881" y="317304"/>
-            <a:ext cx="3240244" cy="707886"/>
-          </a:xfrm>
-          <a:prstGeom prst="rect">
-            <a:avLst/>
-          </a:prstGeom>
-          <a:noFill/>
-        </p:spPr>
-        <p:txBody>
-          <a:bodyPr wrap="square" rtlCol="0">
-            <a:spAutoFit/>
-          </a:bodyPr>
-          <a:lstStyle/>
-          <a:p>
             <a:r>
               <a:rPr lang="en-US" altLang="ko-KR" sz="4000" dirty="0">
                 <a:latin typeface="HY견고딕" panose="02030600000101010101" pitchFamily="18" charset="-127"/>
                 <a:ea typeface="HY견고딕" panose="02030600000101010101" pitchFamily="18" charset="-127"/>
               </a:rPr>
-              <a:t>Main </a:t>
+              <a:t>JSON </a:t>
             </a:r>
             <a:r>
               <a:rPr lang="ko-KR" altLang="en-US" sz="4000" dirty="0">
                 <a:latin typeface="HY견고딕" panose="02030600000101010101" pitchFamily="18" charset="-127"/>
                 <a:ea typeface="HY견고딕" panose="02030600000101010101" pitchFamily="18" charset="-127"/>
               </a:rPr>
-              <a:t>코드</a:t>
-            </a:r>
-            <a:endParaRPr lang="en-US" altLang="ko-KR" sz="4000" dirty="0">
-              <a:latin typeface="HY견고딕" panose="02030600000101010101" pitchFamily="18" charset="-127"/>
-              <a:ea typeface="HY견고딕" panose="02030600000101010101" pitchFamily="18" charset="-127"/>
-            </a:endParaRPr>
-          </a:p>
-        </p:txBody>
-      </p:sp>
-      <p:sp>
-        <p:nvSpPr>
-          <p:cNvPr id="12" name="TextBox 11"/>
-          <p:cNvSpPr txBox="1"/>
-          <p:nvPr/>
-        </p:nvSpPr>
-        <p:spPr>
-          <a:xfrm>
-            <a:off x="6753225" y="2724767"/>
-            <a:ext cx="4581525" cy="1077218"/>
-          </a:xfrm>
-          <a:prstGeom prst="rect">
-            <a:avLst/>
-          </a:prstGeom>
-          <a:noFill/>
-        </p:spPr>
-        <p:txBody>
-          <a:bodyPr wrap="square" rtlCol="0">
-            <a:spAutoFit/>
-          </a:bodyPr>
-          <a:lstStyle/>
-          <a:p>
-            <a:r>
-              <a:rPr lang="en-US" altLang="ko-KR" sz="3200" dirty="0">
+              <a:t>변환</a:t>
+            </a:r>
+            <a:r>
+              <a:rPr lang="en-US" altLang="ko-KR" sz="4000" dirty="0">
                 <a:latin typeface="HY견고딕" panose="02030600000101010101" pitchFamily="18" charset="-127"/>
                 <a:ea typeface="HY견고딕" panose="02030600000101010101" pitchFamily="18" charset="-127"/>
               </a:rPr>
-              <a:t>Azure Table Storage</a:t>
-            </a:r>
-            <a:r>
-              <a:rPr lang="ko-KR" altLang="en-US" sz="3200" dirty="0">
-                <a:latin typeface="HY견고딕" panose="02030600000101010101" pitchFamily="18" charset="-127"/>
-                <a:ea typeface="HY견고딕" panose="02030600000101010101" pitchFamily="18" charset="-127"/>
-              </a:rPr>
-              <a:t>로</a:t>
-            </a:r>
-            <a:r>
-              <a:rPr lang="en-US" altLang="ko-KR" sz="3200" dirty="0">
-                <a:latin typeface="HY견고딕" panose="02030600000101010101" pitchFamily="18" charset="-127"/>
-                <a:ea typeface="HY견고딕" panose="02030600000101010101" pitchFamily="18" charset="-127"/>
-              </a:rPr>
               <a:t> </a:t>
             </a:r>
-            <a:r>
-              <a:rPr lang="ko-KR" altLang="en-US" sz="3200" dirty="0">
-                <a:latin typeface="HY견고딕" panose="02030600000101010101" pitchFamily="18" charset="-127"/>
-                <a:ea typeface="HY견고딕" panose="02030600000101010101" pitchFamily="18" charset="-127"/>
-              </a:rPr>
-              <a:t>전송</a:t>
-            </a:r>
-            <a:endParaRPr lang="en-US" altLang="ko-KR" sz="3200" dirty="0">
-              <a:latin typeface="HY견고딕" panose="02030600000101010101" pitchFamily="18" charset="-127"/>
-              <a:ea typeface="HY견고딕" panose="02030600000101010101" pitchFamily="18" charset="-127"/>
-            </a:endParaRPr>
           </a:p>
         </p:txBody>
       </p:sp>
       <p:pic>
         <p:nvPicPr>
-          <p:cNvPr id="14338" name="Picture 2" descr="https://cdn.discordapp.com/attachments/424058557609148418/1051531197672595456/image.png"/>
+          <p:cNvPr id="8" name="Picture 4" descr="https://cdn.discordapp.com/attachments/424058557609148418/1051527552478478406/image.png"/>
           <p:cNvPicPr>
             <a:picLocks noChangeAspect="1" noChangeArrowheads="1"/>
           </p:cNvPicPr>
@@ -9118,8 +9001,8 @@
         </p:blipFill>
         <p:spPr bwMode="auto">
           <a:xfrm>
-            <a:off x="749439" y="1103886"/>
-            <a:ext cx="5427891" cy="4318981"/>
+            <a:off x="490138" y="1401460"/>
+            <a:ext cx="8676041" cy="4474105"/>
           </a:xfrm>
           <a:prstGeom prst="rect">
             <a:avLst/>
@@ -9136,40 +9019,202 @@
           </a:extLst>
         </p:spPr>
       </p:pic>
-      <p:pic>
-        <p:nvPicPr>
-          <p:cNvPr id="3" name="그림 2">
-            <a:extLst>
-              <a:ext uri="{FF2B5EF4-FFF2-40B4-BE49-F238E27FC236}">
-                <a16:creationId xmlns:a16="http://schemas.microsoft.com/office/drawing/2014/main" id="{0E2B6D5D-A169-B955-F208-50559C341067}"/>
-              </a:ext>
-            </a:extLst>
-          </p:cNvPr>
-          <p:cNvPicPr>
-            <a:picLocks noChangeAspect="1"/>
-          </p:cNvPicPr>
-          <p:nvPr/>
-        </p:nvPicPr>
-        <p:blipFill>
-          <a:blip r:embed="rId3"/>
-          <a:stretch>
-            <a:fillRect/>
-          </a:stretch>
-        </p:blipFill>
-        <p:spPr>
-          <a:xfrm>
-            <a:off x="749439" y="4739456"/>
-            <a:ext cx="10295512" cy="2118544"/>
-          </a:xfrm>
-          <a:prstGeom prst="rect">
-            <a:avLst/>
-          </a:prstGeom>
-        </p:spPr>
-      </p:pic>
+      <p:sp>
+        <p:nvSpPr>
+          <p:cNvPr id="9" name="TextBox 8"/>
+          <p:cNvSpPr txBox="1"/>
+          <p:nvPr/>
+        </p:nvSpPr>
+        <p:spPr>
+          <a:xfrm>
+            <a:off x="7486650" y="1336145"/>
+            <a:ext cx="4514850" cy="4031873"/>
+          </a:xfrm>
+          <a:prstGeom prst="rect">
+            <a:avLst/>
+          </a:prstGeom>
+          <a:solidFill>
+            <a:schemeClr val="bg1">
+              <a:lumMod val="95000"/>
+            </a:schemeClr>
+          </a:solidFill>
+        </p:spPr>
+        <p:txBody>
+          <a:bodyPr wrap="square" rtlCol="0">
+            <a:spAutoFit/>
+          </a:bodyPr>
+          <a:lstStyle/>
+          <a:p>
+            <a:r>
+              <a:rPr lang="ko-KR" altLang="en-US" sz="3200" dirty="0">
+                <a:latin typeface="HY견고딕" panose="02030600000101010101" pitchFamily="18" charset="-127"/>
+                <a:ea typeface="HY견고딕" panose="02030600000101010101" pitchFamily="18" charset="-127"/>
+              </a:rPr>
+              <a:t>타입에 따른 다른 값을 </a:t>
+            </a:r>
+            <a:endParaRPr lang="en-US" altLang="ko-KR" sz="3200" dirty="0">
+              <a:latin typeface="HY견고딕" panose="02030600000101010101" pitchFamily="18" charset="-127"/>
+              <a:ea typeface="HY견고딕" panose="02030600000101010101" pitchFamily="18" charset="-127"/>
+            </a:endParaRPr>
+          </a:p>
+          <a:p>
+            <a:r>
+              <a:rPr lang="ko-KR" altLang="en-US" sz="3200" dirty="0">
+                <a:latin typeface="HY견고딕" panose="02030600000101010101" pitchFamily="18" charset="-127"/>
+                <a:ea typeface="HY견고딕" panose="02030600000101010101" pitchFamily="18" charset="-127"/>
+              </a:rPr>
+              <a:t>반환 하기 위한 </a:t>
+            </a:r>
+            <a:r>
+              <a:rPr lang="en-US" altLang="ko-KR" sz="3200" dirty="0">
+                <a:latin typeface="HY견고딕" panose="02030600000101010101" pitchFamily="18" charset="-127"/>
+                <a:ea typeface="HY견고딕" panose="02030600000101010101" pitchFamily="18" charset="-127"/>
+              </a:rPr>
+              <a:t>Key </a:t>
+            </a:r>
+            <a:r>
+              <a:rPr lang="ko-KR" altLang="en-US" sz="3200" dirty="0">
+                <a:latin typeface="HY견고딕" panose="02030600000101010101" pitchFamily="18" charset="-127"/>
+                <a:ea typeface="HY견고딕" panose="02030600000101010101" pitchFamily="18" charset="-127"/>
+              </a:rPr>
+              <a:t>값</a:t>
+            </a:r>
+            <a:endParaRPr lang="en-US" altLang="ko-KR" sz="3200" dirty="0">
+              <a:latin typeface="HY견고딕" panose="02030600000101010101" pitchFamily="18" charset="-127"/>
+              <a:ea typeface="HY견고딕" panose="02030600000101010101" pitchFamily="18" charset="-127"/>
+            </a:endParaRPr>
+          </a:p>
+          <a:p>
+            <a:endParaRPr lang="en-US" altLang="ko-KR" sz="3200" dirty="0">
+              <a:latin typeface="HY견고딕" panose="02030600000101010101" pitchFamily="18" charset="-127"/>
+              <a:ea typeface="HY견고딕" panose="02030600000101010101" pitchFamily="18" charset="-127"/>
+            </a:endParaRPr>
+          </a:p>
+          <a:p>
+            <a:r>
+              <a:rPr lang="en-US" altLang="ko-KR" sz="3200" dirty="0">
+                <a:latin typeface="HY견고딕" panose="02030600000101010101" pitchFamily="18" charset="-127"/>
+                <a:ea typeface="HY견고딕" panose="02030600000101010101" pitchFamily="18" charset="-127"/>
+              </a:rPr>
+              <a:t>0</a:t>
+            </a:r>
+            <a:r>
+              <a:rPr lang="ko-KR" altLang="en-US" sz="3200" dirty="0">
+                <a:latin typeface="HY견고딕" panose="02030600000101010101" pitchFamily="18" charset="-127"/>
+                <a:ea typeface="HY견고딕" panose="02030600000101010101" pitchFamily="18" charset="-127"/>
+              </a:rPr>
+              <a:t>은 </a:t>
+            </a:r>
+            <a:r>
+              <a:rPr lang="en-US" altLang="ko-KR" sz="3200" dirty="0">
+                <a:latin typeface="HY견고딕" panose="02030600000101010101" pitchFamily="18" charset="-127"/>
+                <a:ea typeface="HY견고딕" panose="02030600000101010101" pitchFamily="18" charset="-127"/>
+              </a:rPr>
+              <a:t>Azure</a:t>
+            </a:r>
+            <a:r>
+              <a:rPr lang="ko-KR" altLang="en-US" sz="3200" dirty="0">
+                <a:latin typeface="HY견고딕" panose="02030600000101010101" pitchFamily="18" charset="-127"/>
+                <a:ea typeface="HY견고딕" panose="02030600000101010101" pitchFamily="18" charset="-127"/>
+              </a:rPr>
+              <a:t>용</a:t>
+            </a:r>
+            <a:endParaRPr lang="en-US" altLang="ko-KR" sz="3200" dirty="0">
+              <a:latin typeface="HY견고딕" panose="02030600000101010101" pitchFamily="18" charset="-127"/>
+              <a:ea typeface="HY견고딕" panose="02030600000101010101" pitchFamily="18" charset="-127"/>
+            </a:endParaRPr>
+          </a:p>
+          <a:p>
+            <a:endParaRPr lang="en-US" altLang="ko-KR" sz="3200" dirty="0">
+              <a:latin typeface="HY견고딕" panose="02030600000101010101" pitchFamily="18" charset="-127"/>
+              <a:ea typeface="HY견고딕" panose="02030600000101010101" pitchFamily="18" charset="-127"/>
+            </a:endParaRPr>
+          </a:p>
+          <a:p>
+            <a:r>
+              <a:rPr lang="en-US" altLang="ko-KR" sz="3200" dirty="0">
+                <a:latin typeface="HY견고딕" panose="02030600000101010101" pitchFamily="18" charset="-127"/>
+                <a:ea typeface="HY견고딕" panose="02030600000101010101" pitchFamily="18" charset="-127"/>
+              </a:rPr>
+              <a:t>1</a:t>
+            </a:r>
+            <a:r>
+              <a:rPr lang="ko-KR" altLang="en-US" sz="3200" dirty="0">
+                <a:latin typeface="HY견고딕" panose="02030600000101010101" pitchFamily="18" charset="-127"/>
+                <a:ea typeface="HY견고딕" panose="02030600000101010101" pitchFamily="18" charset="-127"/>
+              </a:rPr>
+              <a:t>은</a:t>
+            </a:r>
+            <a:r>
+              <a:rPr lang="en-US" altLang="ko-KR" sz="3200" dirty="0">
+                <a:latin typeface="HY견고딕" panose="02030600000101010101" pitchFamily="18" charset="-127"/>
+                <a:ea typeface="HY견고딕" panose="02030600000101010101" pitchFamily="18" charset="-127"/>
+              </a:rPr>
+              <a:t> Python</a:t>
+            </a:r>
+            <a:r>
+              <a:rPr lang="ko-KR" altLang="en-US" sz="3200" dirty="0">
+                <a:latin typeface="HY견고딕" panose="02030600000101010101" pitchFamily="18" charset="-127"/>
+                <a:ea typeface="HY견고딕" panose="02030600000101010101" pitchFamily="18" charset="-127"/>
+              </a:rPr>
+              <a:t>용</a:t>
+            </a:r>
+            <a:endParaRPr lang="en-US" altLang="ko-KR" sz="3200" dirty="0">
+              <a:latin typeface="HY견고딕" panose="02030600000101010101" pitchFamily="18" charset="-127"/>
+              <a:ea typeface="HY견고딕" panose="02030600000101010101" pitchFamily="18" charset="-127"/>
+            </a:endParaRPr>
+          </a:p>
+          <a:p>
+            <a:endParaRPr lang="en-US" altLang="ko-KR" sz="3200" dirty="0">
+              <a:latin typeface="HY견고딕" panose="02030600000101010101" pitchFamily="18" charset="-127"/>
+              <a:ea typeface="HY견고딕" panose="02030600000101010101" pitchFamily="18" charset="-127"/>
+            </a:endParaRPr>
+          </a:p>
+          <a:p>
+            <a:endParaRPr lang="en-US" altLang="ko-KR" sz="3200" dirty="0">
+              <a:latin typeface="HY견고딕" panose="02030600000101010101" pitchFamily="18" charset="-127"/>
+              <a:ea typeface="HY견고딕" panose="02030600000101010101" pitchFamily="18" charset="-127"/>
+            </a:endParaRPr>
+          </a:p>
+        </p:txBody>
+      </p:sp>
+      <p:sp>
+        <p:nvSpPr>
+          <p:cNvPr id="11" name="TextBox 10"/>
+          <p:cNvSpPr txBox="1"/>
+          <p:nvPr/>
+        </p:nvSpPr>
+        <p:spPr>
+          <a:xfrm>
+            <a:off x="4632192" y="501970"/>
+            <a:ext cx="3374664" cy="523220"/>
+          </a:xfrm>
+          <a:prstGeom prst="rect">
+            <a:avLst/>
+          </a:prstGeom>
+          <a:noFill/>
+        </p:spPr>
+        <p:txBody>
+          <a:bodyPr wrap="square" rtlCol="0">
+            <a:spAutoFit/>
+          </a:bodyPr>
+          <a:lstStyle/>
+          <a:p>
+            <a:pPr fontAlgn="base"/>
+            <a:r>
+              <a:rPr lang="en-US" altLang="ko-KR" sz="2800" dirty="0">
+                <a:latin typeface="HY견고딕" panose="02030600000101010101" pitchFamily="18" charset="-127"/>
+                <a:ea typeface="HY견고딕" panose="02030600000101010101" pitchFamily="18" charset="-127"/>
+              </a:rPr>
+              <a:t>bus_data_file.py</a:t>
+            </a:r>
+          </a:p>
+        </p:txBody>
+      </p:sp>
     </p:spTree>
     <p:extLst>
       <p:ext uri="{BB962C8B-B14F-4D97-AF65-F5344CB8AC3E}">
-        <p14:creationId xmlns:p14="http://schemas.microsoft.com/office/powerpoint/2010/main" val="200861489"/>
+        <p14:creationId xmlns:p14="http://schemas.microsoft.com/office/powerpoint/2010/main" val="598115194"/>
       </p:ext>
     </p:extLst>
   </p:cSld>
@@ -9367,14 +9412,14 @@
       </p:sp>
       <p:sp>
         <p:nvSpPr>
-          <p:cNvPr id="10" name="TextBox 9"/>
+          <p:cNvPr id="8" name="TextBox 7"/>
           <p:cNvSpPr txBox="1"/>
           <p:nvPr/>
         </p:nvSpPr>
         <p:spPr>
           <a:xfrm>
-            <a:off x="1188881" y="317304"/>
-            <a:ext cx="5173819" cy="707886"/>
+            <a:off x="6177330" y="501970"/>
+            <a:ext cx="3374664" cy="523220"/>
           </a:xfrm>
           <a:prstGeom prst="rect">
             <a:avLst/>
@@ -9387,26 +9432,70 @@
           </a:bodyPr>
           <a:lstStyle/>
           <a:p>
+            <a:pPr fontAlgn="base"/>
+            <a:r>
+              <a:rPr lang="en-US" altLang="ko-KR" sz="2800" dirty="0">
+                <a:latin typeface="HY견고딕" panose="02030600000101010101" pitchFamily="18" charset="-127"/>
+                <a:ea typeface="HY견고딕" panose="02030600000101010101" pitchFamily="18" charset="-127"/>
+              </a:rPr>
+              <a:t>__init__.py</a:t>
+            </a:r>
+          </a:p>
+        </p:txBody>
+      </p:sp>
+      <p:sp>
+        <p:nvSpPr>
+          <p:cNvPr id="11" name="TextBox 10"/>
+          <p:cNvSpPr txBox="1"/>
+          <p:nvPr/>
+        </p:nvSpPr>
+        <p:spPr>
+          <a:xfrm>
+            <a:off x="1188881" y="317304"/>
+            <a:ext cx="3240244" cy="707886"/>
+          </a:xfrm>
+          <a:prstGeom prst="rect">
+            <a:avLst/>
+          </a:prstGeom>
+          <a:noFill/>
+        </p:spPr>
+        <p:txBody>
+          <a:bodyPr wrap="square" rtlCol="0">
+            <a:spAutoFit/>
+          </a:bodyPr>
+          <a:lstStyle/>
+          <a:p>
             <a:r>
               <a:rPr lang="en-US" altLang="ko-KR" sz="4000" dirty="0">
                 <a:latin typeface="HY견고딕" panose="02030600000101010101" pitchFamily="18" charset="-127"/>
                 <a:ea typeface="HY견고딕" panose="02030600000101010101" pitchFamily="18" charset="-127"/>
               </a:rPr>
-              <a:t>Storage Table</a:t>
-            </a:r>
-          </a:p>
-        </p:txBody>
-      </p:sp>
-      <p:sp>
-        <p:nvSpPr>
-          <p:cNvPr id="7" name="TextBox 6"/>
+              <a:t>Main </a:t>
+            </a:r>
+            <a:r>
+              <a:rPr lang="ko-KR" altLang="en-US" sz="4000" dirty="0">
+                <a:latin typeface="HY견고딕" panose="02030600000101010101" pitchFamily="18" charset="-127"/>
+                <a:ea typeface="HY견고딕" panose="02030600000101010101" pitchFamily="18" charset="-127"/>
+              </a:rPr>
+              <a:t>코드</a:t>
+            </a:r>
+            <a:endParaRPr lang="en-US" altLang="ko-KR" sz="4000" dirty="0">
+              <a:latin typeface="HY견고딕" panose="02030600000101010101" pitchFamily="18" charset="-127"/>
+              <a:ea typeface="HY견고딕" panose="02030600000101010101" pitchFamily="18" charset="-127"/>
+            </a:endParaRPr>
+          </a:p>
+        </p:txBody>
+      </p:sp>
+      <p:sp>
+        <p:nvSpPr>
+          <p:cNvPr id="12" name="TextBox 11"/>
           <p:cNvSpPr txBox="1"/>
           <p:nvPr/>
         </p:nvSpPr>
         <p:spPr>
           <a:xfrm>
-            <a:off x="6177330" y="501970"/>
-            <a:ext cx="3374664" cy="523220"/>
+            <a:off x="6753225" y="2724767"/>
+            <a:ext cx="4581525" cy="1077218"/>
           </a:xfrm>
           <a:prstGeom prst="rect">
             <a:avLst/>
@@ -9419,20 +9508,44 @@
           </a:bodyPr>
           <a:lstStyle/>
           <a:p>
-            <a:pPr fontAlgn="base"/>
-            <a:r>
-              <a:rPr lang="en-US" altLang="ko-KR" sz="2800" dirty="0">
+            <a:r>
+              <a:rPr lang="en-US" altLang="ko-KR" sz="3200" dirty="0">
                 <a:latin typeface="HY견고딕" panose="02030600000101010101" pitchFamily="18" charset="-127"/>
                 <a:ea typeface="HY견고딕" panose="02030600000101010101" pitchFamily="18" charset="-127"/>
               </a:rPr>
-              <a:t>Azure</a:t>
-            </a:r>
+              <a:t>Azure Table Storage</a:t>
+            </a:r>
+            <a:r>
+              <a:rPr lang="ko-KR" altLang="en-US" sz="3200" dirty="0">
+                <a:latin typeface="HY견고딕" panose="02030600000101010101" pitchFamily="18" charset="-127"/>
+                <a:ea typeface="HY견고딕" panose="02030600000101010101" pitchFamily="18" charset="-127"/>
+              </a:rPr>
+              <a:t>로</a:t>
+            </a:r>
+            <a:r>
+              <a:rPr lang="en-US" altLang="ko-KR" sz="3200" dirty="0">
+                <a:latin typeface="HY견고딕" panose="02030600000101010101" pitchFamily="18" charset="-127"/>
+                <a:ea typeface="HY견고딕" panose="02030600000101010101" pitchFamily="18" charset="-127"/>
+              </a:rPr>
+              <a:t> </a:t>
+            </a:r>
+            <a:r>
+              <a:rPr lang="ko-KR" altLang="en-US" sz="3200" dirty="0">
+                <a:latin typeface="HY견고딕" panose="02030600000101010101" pitchFamily="18" charset="-127"/>
+                <a:ea typeface="HY견고딕" panose="02030600000101010101" pitchFamily="18" charset="-127"/>
+              </a:rPr>
+              <a:t>전송</a:t>
+            </a:r>
+            <a:endParaRPr lang="en-US" altLang="ko-KR" sz="3200" dirty="0">
+              <a:latin typeface="HY견고딕" panose="02030600000101010101" pitchFamily="18" charset="-127"/>
+              <a:ea typeface="HY견고딕" panose="02030600000101010101" pitchFamily="18" charset="-127"/>
+            </a:endParaRPr>
           </a:p>
         </p:txBody>
       </p:sp>
       <p:pic>
         <p:nvPicPr>
-          <p:cNvPr id="13318" name="Picture 6" descr="https://cdn.discordapp.com/attachments/424058557609148418/1051532839528693861/image.png"/>
+          <p:cNvPr id="14338" name="Picture 2" descr="https://cdn.discordapp.com/attachments/424058557609148418/1051531197672595456/image.png"/>
           <p:cNvPicPr>
             <a:picLocks noChangeAspect="1" noChangeArrowheads="1"/>
           </p:cNvPicPr>
@@ -9453,8 +9566,8 @@
         </p:blipFill>
         <p:spPr bwMode="auto">
           <a:xfrm>
-            <a:off x="1" y="1355635"/>
-            <a:ext cx="6629400" cy="3518113"/>
+            <a:off x="749439" y="1103886"/>
+            <a:ext cx="5427891" cy="4318981"/>
           </a:xfrm>
           <a:prstGeom prst="rect">
             <a:avLst/>
@@ -9473,47 +9586,38 @@
       </p:pic>
       <p:pic>
         <p:nvPicPr>
-          <p:cNvPr id="13320" name="Picture 8" descr="https://cdn.discordapp.com/attachments/424058557609148418/1051532952275800174/image.png"/>
-          <p:cNvPicPr>
-            <a:picLocks noChangeAspect="1" noChangeArrowheads="1"/>
-          </p:cNvPicPr>
-          <p:nvPr/>
-        </p:nvPicPr>
-        <p:blipFill rotWithShape="1">
-          <a:blip r:embed="rId3">
+          <p:cNvPr id="3" name="그림 2">
             <a:extLst>
-              <a:ext uri="{28A0092B-C50C-407E-A947-70E740481C1C}">
-                <a14:useLocalDpi xmlns:a14="http://schemas.microsoft.com/office/drawing/2010/main" val="0"/>
+              <a:ext uri="{FF2B5EF4-FFF2-40B4-BE49-F238E27FC236}">
+                <a16:creationId xmlns:a16="http://schemas.microsoft.com/office/drawing/2014/main" id="{0E2B6D5D-A169-B955-F208-50559C341067}"/>
               </a:ext>
             </a:extLst>
-          </a:blip>
-          <a:srcRect r="5908"/>
-          <a:stretch/>
+          </p:cNvPr>
+          <p:cNvPicPr>
+            <a:picLocks noChangeAspect="1"/>
+          </p:cNvPicPr>
+          <p:nvPr/>
+        </p:nvPicPr>
+        <p:blipFill>
+          <a:blip r:embed="rId3"/>
+          <a:stretch>
+            <a:fillRect/>
+          </a:stretch>
         </p:blipFill>
-        <p:spPr bwMode="auto">
-          <a:xfrm>
-            <a:off x="6629401" y="1355636"/>
-            <a:ext cx="5460999" cy="3523958"/>
-          </a:xfrm>
-          <a:prstGeom prst="rect">
-            <a:avLst/>
-          </a:prstGeom>
-          <a:noFill/>
-          <a:extLst>
-            <a:ext uri="{909E8E84-426E-40DD-AFC4-6F175D3DCCD1}">
-              <a14:hiddenFill xmlns:a14="http://schemas.microsoft.com/office/drawing/2010/main">
-                <a:solidFill>
-                  <a:srgbClr val="FFFFFF"/>
-                </a:solidFill>
-              </a14:hiddenFill>
-            </a:ext>
-          </a:extLst>
+        <p:spPr>
+          <a:xfrm>
+            <a:off x="749439" y="4739456"/>
+            <a:ext cx="10295512" cy="2118544"/>
+          </a:xfrm>
+          <a:prstGeom prst="rect">
+            <a:avLst/>
+          </a:prstGeom>
         </p:spPr>
       </p:pic>
     </p:spTree>
     <p:extLst>
       <p:ext uri="{BB962C8B-B14F-4D97-AF65-F5344CB8AC3E}">
-        <p14:creationId xmlns:p14="http://schemas.microsoft.com/office/powerpoint/2010/main" val="3156602892"/>
+        <p14:creationId xmlns:p14="http://schemas.microsoft.com/office/powerpoint/2010/main" val="200861489"/>
       </p:ext>
     </p:extLst>
   </p:cSld>

</xml_diff>